<commit_message>
second presentation + tekst
</commit_message>
<xml_diff>
--- a/thesis/presentations/2 second/second.pptx
+++ b/thesis/presentations/2 second/second.pptx
@@ -140,7 +140,7 @@
   </p:defaultTextStyle>
   <p:extLst>
     <p:ext uri="{EFAFB233-063F-42B5-8137-9DF3F51BA10A}">
-      <p15:sldGuideLst xmlns:p15="http://schemas.microsoft.com/office/powerpoint/2012/main" xmlns="">
+      <p15:sldGuideLst xmlns="" xmlns:p15="http://schemas.microsoft.com/office/powerpoint/2012/main">
         <p15:guide id="1" orient="horz" pos="2160" userDrawn="1">
           <p15:clr>
             <a:srgbClr val="A4A3A4"/>
@@ -181,16 +181,8 @@
               <a:defRPr/>
             </a:pPr>
             <a:r>
-              <a:rPr lang="en-US" dirty="0" smtClean="0"/>
-              <a:t>Score</a:t>
-            </a:r>
-            <a:r>
-              <a:rPr lang="en-US" baseline="0" dirty="0" smtClean="0"/>
-              <a:t> </a:t>
-            </a:r>
-            <a:r>
-              <a:rPr lang="en-US" baseline="0" dirty="0" err="1" smtClean="0"/>
-              <a:t>k</a:t>
+              <a:rPr lang="en-US" baseline="0" dirty="0" err="1" smtClean="0"/>
+              <a:t>K</a:t>
             </a:r>
             <a:r>
               <a:rPr lang="en-US" dirty="0" err="1" smtClean="0"/>
@@ -206,7 +198,21 @@
             </a:r>
             <a:r>
               <a:rPr lang="en-US" baseline="0" dirty="0" smtClean="0"/>
-              <a:t> van 3x3 </a:t>
+              <a:t> van </a:t>
+            </a:r>
+            <a:r>
+              <a:rPr lang="en-US" sz="2160" b="1" i="0" u="none" strike="noStrike" baseline="0" dirty="0" smtClean="0">
+                <a:effectLst/>
+              </a:rPr>
+              <a:t>score</a:t>
+            </a:r>
+            <a:r>
+              <a:rPr lang="en-US" baseline="0" dirty="0" smtClean="0"/>
+              <a:t> </a:t>
+            </a:r>
+            <a:r>
+              <a:rPr lang="en-US" baseline="0" dirty="0" smtClean="0"/>
+              <a:t>van 3x3 </a:t>
             </a:r>
             <a:r>
               <a:rPr lang="en-US" baseline="0" dirty="0" err="1" smtClean="0"/>
@@ -425,11 +431,11 @@
           <c:showBubbleSize val="0"/>
         </c:dLbls>
         <c:gapWidth val="150"/>
-        <c:axId val="130548480"/>
-        <c:axId val="130550400"/>
+        <c:axId val="130329600"/>
+        <c:axId val="130335872"/>
       </c:barChart>
       <c:catAx>
-        <c:axId val="130548480"/>
+        <c:axId val="130329600"/>
         <c:scaling>
           <c:orientation val="minMax"/>
         </c:scaling>
@@ -459,7 +465,7 @@
         <c:majorTickMark val="out"/>
         <c:minorTickMark val="none"/>
         <c:tickLblPos val="nextTo"/>
-        <c:crossAx val="130550400"/>
+        <c:crossAx val="130335872"/>
         <c:crosses val="autoZero"/>
         <c:auto val="1"/>
         <c:lblAlgn val="ctr"/>
@@ -467,7 +473,7 @@
         <c:noMultiLvlLbl val="0"/>
       </c:catAx>
       <c:valAx>
-        <c:axId val="130550400"/>
+        <c:axId val="130335872"/>
         <c:scaling>
           <c:orientation val="minMax"/>
         </c:scaling>
@@ -498,7 +504,7 @@
         <c:majorTickMark val="out"/>
         <c:minorTickMark val="none"/>
         <c:tickLblPos val="nextTo"/>
-        <c:crossAx val="130548480"/>
+        <c:crossAx val="130329600"/>
         <c:crosses val="autoZero"/>
         <c:crossBetween val="between"/>
       </c:valAx>
@@ -610,7 +616,7 @@
           <a:p>
             <a:fld id="{D6D09D9E-0F22-44ED-B43C-3F44EA87E898}" type="datetimeFigureOut">
               <a:rPr lang="en-US" smtClean="0"/>
-              <a:t>25-Nov-17</a:t>
+              <a:t>26-Nov-17</a:t>
             </a:fld>
             <a:endParaRPr lang="en-US"/>
           </a:p>
@@ -775,7 +781,7 @@
           <a:p>
             <a:fld id="{554F67E3-005B-4A5B-A64B-4E620D6532D3}" type="datetimeFigureOut">
               <a:rPr lang="nl-NL" smtClean="0"/>
-              <a:t>25-11-2017</a:t>
+              <a:t>26-11-2017</a:t>
             </a:fld>
             <a:endParaRPr lang="nl-NL"/>
           </a:p>
@@ -1718,11 +1724,7 @@
             </a:r>
             <a:r>
               <a:rPr lang="en-US" baseline="0" dirty="0" smtClean="0"/>
-              <a:t> </a:t>
-            </a:r>
-            <a:r>
-              <a:rPr lang="en-US" baseline="0" dirty="0" smtClean="0"/>
-              <a:t>PPL of van </a:t>
+              <a:t> PPL of van </a:t>
             </a:r>
             <a:r>
               <a:rPr lang="en-US" baseline="0" dirty="0" err="1" smtClean="0"/>
@@ -5685,11 +5687,7 @@
             </a:r>
             <a:r>
               <a:rPr lang="en-US" baseline="0" dirty="0" smtClean="0"/>
-              <a:t> in </a:t>
-            </a:r>
-            <a:r>
-              <a:rPr lang="en-US" baseline="0" dirty="0" smtClean="0"/>
-              <a:t>de </a:t>
+              <a:t> in de </a:t>
             </a:r>
             <a:r>
               <a:rPr lang="en-US" baseline="0" dirty="0" err="1" smtClean="0"/>
@@ -6288,7 +6286,7 @@
   </p:clrMapOvr>
   <p:extLst mod="1">
     <p:ext uri="{DCECCB84-F9BA-43D5-87BE-67443E8EF086}">
-      <p15:sldGuideLst xmlns:p15="http://schemas.microsoft.com/office/powerpoint/2012/main" xmlns="">
+      <p15:sldGuideLst xmlns="" xmlns:p15="http://schemas.microsoft.com/office/powerpoint/2012/main">
         <p15:guide id="1" orient="horz" pos="3929" userDrawn="1">
           <p15:clr>
             <a:srgbClr val="FBAE40"/>
@@ -6599,7 +6597,7 @@
   </p:clrMapOvr>
   <p:extLst mod="1">
     <p:ext uri="{DCECCB84-F9BA-43D5-87BE-67443E8EF086}">
-      <p15:sldGuideLst xmlns:p15="http://schemas.microsoft.com/office/powerpoint/2012/main" xmlns="">
+      <p15:sldGuideLst xmlns="" xmlns:p15="http://schemas.microsoft.com/office/powerpoint/2012/main">
         <p15:guide id="1" orient="horz" pos="3929">
           <p15:clr>
             <a:srgbClr val="FBAE40"/>
@@ -6887,7 +6885,7 @@
           <a:p>
             <a:fld id="{BA252000-72D1-4588-81D0-A21B268C4F60}" type="datetime1">
               <a:rPr lang="nl-BE" smtClean="0"/>
-              <a:t>25/11/2017</a:t>
+              <a:t>26/11/2017</a:t>
             </a:fld>
             <a:endParaRPr lang="nl-NL" dirty="0"/>
           </a:p>
@@ -6952,7 +6950,7 @@
   </p:clrMapOvr>
   <p:extLst mod="1">
     <p:ext uri="{DCECCB84-F9BA-43D5-87BE-67443E8EF086}">
-      <p15:sldGuideLst xmlns:p15="http://schemas.microsoft.com/office/powerpoint/2012/main" xmlns="">
+      <p15:sldGuideLst xmlns="" xmlns:p15="http://schemas.microsoft.com/office/powerpoint/2012/main">
         <p15:guide id="1" orient="horz" pos="2160">
           <p15:clr>
             <a:srgbClr val="FBAE40"/>
@@ -7194,7 +7192,7 @@
           <a:p>
             <a:fld id="{51B5EE41-54AE-48CB-8D18-4748453B9BC8}" type="datetime1">
               <a:rPr lang="nl-BE" smtClean="0"/>
-              <a:t>25/11/2017</a:t>
+              <a:t>26/11/2017</a:t>
             </a:fld>
             <a:endParaRPr lang="nl-NL" dirty="0"/>
           </a:p>
@@ -7259,7 +7257,7 @@
   </p:clrMapOvr>
   <p:extLst mod="1">
     <p:ext uri="{DCECCB84-F9BA-43D5-87BE-67443E8EF086}">
-      <p15:sldGuideLst xmlns:p15="http://schemas.microsoft.com/office/powerpoint/2012/main" xmlns="">
+      <p15:sldGuideLst xmlns="" xmlns:p15="http://schemas.microsoft.com/office/powerpoint/2012/main">
         <p15:guide id="1" orient="horz" pos="2160">
           <p15:clr>
             <a:srgbClr val="FBAE40"/>
@@ -7310,7 +7308,7 @@
           <a:p>
             <a:fld id="{325CFB26-3E0B-43F3-B1DB-8FF4C39B3D0D}" type="datetime1">
               <a:rPr lang="nl-BE" smtClean="0"/>
-              <a:t>25/11/2017</a:t>
+              <a:t>26/11/2017</a:t>
             </a:fld>
             <a:endParaRPr lang="nl-NL" dirty="0"/>
           </a:p>
@@ -7700,7 +7698,7 @@
           <a:p>
             <a:fld id="{DC4FC34B-922A-43D1-878B-5EF44FE511A8}" type="datetime1">
               <a:rPr lang="nl-BE" smtClean="0"/>
-              <a:t>25/11/2017</a:t>
+              <a:t>26/11/2017</a:t>
             </a:fld>
             <a:endParaRPr lang="nl-NL" dirty="0"/>
           </a:p>
@@ -7819,7 +7817,7 @@
   </p:clrMapOvr>
   <p:extLst mod="1">
     <p:ext uri="{DCECCB84-F9BA-43D5-87BE-67443E8EF086}">
-      <p15:sldGuideLst xmlns:p15="http://schemas.microsoft.com/office/powerpoint/2012/main" xmlns="">
+      <p15:sldGuideLst xmlns="" xmlns:p15="http://schemas.microsoft.com/office/powerpoint/2012/main">
         <p15:guide id="1" orient="horz" pos="2160" userDrawn="1">
           <p15:clr>
             <a:srgbClr val="FBAE40"/>
@@ -8031,7 +8029,7 @@
           <a:p>
             <a:fld id="{FD918A91-1924-4471-9808-ACB04D0ED8EA}" type="datetime1">
               <a:rPr lang="nl-BE" smtClean="0"/>
-              <a:t>25/11/2017</a:t>
+              <a:t>26/11/2017</a:t>
             </a:fld>
             <a:endParaRPr lang="nl-NL" dirty="0"/>
           </a:p>
@@ -8150,7 +8148,7 @@
   </p:clrMapOvr>
   <p:extLst mod="1">
     <p:ext uri="{DCECCB84-F9BA-43D5-87BE-67443E8EF086}">
-      <p15:sldGuideLst xmlns:p15="http://schemas.microsoft.com/office/powerpoint/2012/main" xmlns="">
+      <p15:sldGuideLst xmlns="" xmlns:p15="http://schemas.microsoft.com/office/powerpoint/2012/main">
         <p15:guide id="1" orient="horz" pos="2160" userDrawn="1">
           <p15:clr>
             <a:srgbClr val="FBAE40"/>
@@ -8321,7 +8319,7 @@
           <a:p>
             <a:fld id="{EA5FBAB9-5FA3-46D6-A3EF-8850D13E3E94}" type="datetime1">
               <a:rPr lang="nl-BE" smtClean="0"/>
-              <a:t>25/11/2017</a:t>
+              <a:t>26/11/2017</a:t>
             </a:fld>
             <a:endParaRPr lang="nl-NL" dirty="0"/>
           </a:p>
@@ -8700,7 +8698,7 @@
           <a:p>
             <a:fld id="{D02784A5-45C8-4246-ADE0-8842E3C66E5D}" type="datetime1">
               <a:rPr lang="nl-BE" smtClean="0"/>
-              <a:t>25/11/2017</a:t>
+              <a:t>26/11/2017</a:t>
             </a:fld>
             <a:endParaRPr lang="nl-NL" dirty="0"/>
           </a:p>
@@ -8823,7 +8821,7 @@
           <a:p>
             <a:fld id="{C477E6CE-7017-4F77-9645-5F8638D9B9E2}" type="datetime1">
               <a:rPr lang="nl-BE" smtClean="0"/>
-              <a:t>25/11/2017</a:t>
+              <a:t>26/11/2017</a:t>
             </a:fld>
             <a:endParaRPr lang="nl-NL" dirty="0"/>
           </a:p>
@@ -8946,7 +8944,7 @@
           <a:p>
             <a:fld id="{56055E81-6827-4C1D-AD12-F50C5BE907ED}" type="datetime1">
               <a:rPr lang="nl-BE" smtClean="0"/>
-              <a:t>25/11/2017</a:t>
+              <a:t>26/11/2017</a:t>
             </a:fld>
             <a:endParaRPr lang="nl-NL" dirty="0"/>
           </a:p>
@@ -9095,7 +9093,7 @@
           <a:p>
             <a:fld id="{F7042BA5-0515-4B7F-B8A4-B74FD521147B}" type="datetime1">
               <a:rPr lang="nl-BE" smtClean="0"/>
-              <a:t>25/11/2017</a:t>
+              <a:t>26/11/2017</a:t>
             </a:fld>
             <a:endParaRPr lang="nl-NL" dirty="0"/>
           </a:p>
@@ -9263,7 +9261,7 @@
           <a:p>
             <a:fld id="{09EF3F9E-B585-4D67-B28C-5D7ABCECB608}" type="datetime1">
               <a:rPr lang="nl-BE" smtClean="0"/>
-              <a:t>25/11/2017</a:t>
+              <a:t>26/11/2017</a:t>
             </a:fld>
             <a:endParaRPr lang="nl-NL" dirty="0"/>
           </a:p>
@@ -9777,7 +9775,7 @@
   </p:txStyles>
   <p:extLst mod="1">
     <p:ext uri="{27BBF7A9-308A-43DC-89C8-2F10F3537804}">
-      <p15:sldGuideLst xmlns:p15="http://schemas.microsoft.com/office/powerpoint/2012/main" xmlns="">
+      <p15:sldGuideLst xmlns="" xmlns:p15="http://schemas.microsoft.com/office/powerpoint/2012/main">
         <p15:guide id="1" orient="horz" pos="3816" userDrawn="1">
           <p15:clr>
             <a:srgbClr val="F26B43"/>
@@ -9901,7 +9899,7 @@
           <a:p>
             <a:fld id="{15BE6352-CF92-4CB8-B2C0-9F716CAEF608}" type="datetime1">
               <a:rPr lang="nl-BE" smtClean="0"/>
-              <a:t>25/11/2017</a:t>
+              <a:t>26/11/2017</a:t>
             </a:fld>
             <a:endParaRPr lang="nl-NL" dirty="0"/>
           </a:p>
@@ -10409,7 +10407,7 @@
   </p:txStyles>
   <p:extLst mod="1">
     <p:ext uri="{27BBF7A9-308A-43DC-89C8-2F10F3537804}">
-      <p15:sldGuideLst xmlns:p15="http://schemas.microsoft.com/office/powerpoint/2012/main" xmlns="">
+      <p15:sldGuideLst xmlns="" xmlns:p15="http://schemas.microsoft.com/office/powerpoint/2012/main">
         <p15:guide id="1" orient="horz" pos="1026" userDrawn="1">
           <p15:clr>
             <a:srgbClr val="F26B43"/>
@@ -11873,7 +11871,6 @@
                 <a:rPr lang="en-US" dirty="0"/>
                 <a:t> PPL</a:t>
               </a:r>
-              <a:endParaRPr lang="en-US" dirty="0"/>
             </a:p>
           </p:txBody>
         </p:sp>
@@ -12100,11 +12097,7 @@
               </a:r>
               <a:r>
                 <a:rPr lang="en-US" dirty="0" smtClean="0"/>
-                <a:t> </a:t>
-              </a:r>
-              <a:r>
-                <a:rPr lang="en-US" dirty="0" smtClean="0"/>
-                <a:t>PPL</a:t>
+                <a:t> PPL</a:t>
               </a:r>
               <a:endParaRPr lang="en-US" dirty="0"/>
             </a:p>
@@ -12237,7 +12230,6 @@
                 <a:rPr lang="en-US" dirty="0"/>
                 <a:t> PPL</a:t>
               </a:r>
-              <a:endParaRPr lang="en-US" dirty="0"/>
             </a:p>
           </p:txBody>
         </p:sp>
@@ -18426,7 +18418,7 @@
             <p:ph sz="quarter" idx="13"/>
             <p:extLst>
               <p:ext uri="{D42A27DB-BD31-4B8C-83A1-F6EECF244321}">
-                <p14:modId xmlns:p14="http://schemas.microsoft.com/office/powerpoint/2010/main" val="2814454932"/>
+                <p14:modId xmlns:p14="http://schemas.microsoft.com/office/powerpoint/2010/main" val="545286861"/>
               </p:ext>
             </p:extLst>
           </p:nvPr>
@@ -18722,7 +18714,6 @@
               <a:rPr lang="en-US" dirty="0" smtClean="0"/>
               <a:t>.</a:t>
             </a:r>
-            <a:endParaRPr lang="en-US" dirty="0" smtClean="0"/>
           </a:p>
           <a:p>
             <a:r>
@@ -18731,11 +18722,7 @@
             </a:r>
             <a:r>
               <a:rPr lang="en-US" dirty="0" smtClean="0"/>
-              <a:t> </a:t>
-            </a:r>
-            <a:r>
-              <a:rPr lang="en-US" dirty="0" smtClean="0"/>
-              <a:t>PPL </a:t>
+              <a:t> PPL </a:t>
             </a:r>
             <a:r>
               <a:rPr lang="en-US" dirty="0" err="1" smtClean="0"/>
@@ -18743,11 +18730,7 @@
             </a:r>
             <a:r>
               <a:rPr lang="en-US" dirty="0" smtClean="0"/>
-              <a:t> </a:t>
-            </a:r>
-            <a:r>
-              <a:rPr lang="en-US" dirty="0" smtClean="0"/>
-              <a:t>en </a:t>
+              <a:t> en </a:t>
             </a:r>
             <a:r>
               <a:rPr lang="en-US" dirty="0" err="1" smtClean="0"/>
@@ -22255,7 +22238,7 @@
   <a:extraClrSchemeLst/>
   <a:extLst>
     <a:ext uri="{05A4C25C-085E-4340-85A3-A5531E510DB2}">
-      <thm15:themeFamily xmlns:thm15="http://schemas.microsoft.com/office/thememl/2012/main" xmlns="" name="Office Theme" id="{62F939B6-93AF-4DB8-9C6B-D6C7DFDC589F}" vid="{4A3C46E8-61CC-4603-A589-7422A47A8E4A}"/>
+      <thm15:themeFamily xmlns="" xmlns:thm15="http://schemas.microsoft.com/office/thememl/2012/main" name="Office Theme" id="{62F939B6-93AF-4DB8-9C6B-D6C7DFDC589F}" vid="{4A3C46E8-61CC-4603-A589-7422A47A8E4A}"/>
     </a:ext>
   </a:extLst>
 </a:theme>
@@ -22516,7 +22499,7 @@
   <a:extraClrSchemeLst/>
   <a:extLst>
     <a:ext uri="{05A4C25C-085E-4340-85A3-A5531E510DB2}">
-      <thm15:themeFamily xmlns:thm15="http://schemas.microsoft.com/office/thememl/2012/main" xmlns="" name="Office Theme" id="{62F939B6-93AF-4DB8-9C6B-D6C7DFDC589F}" vid="{4A3C46E8-61CC-4603-A589-7422A47A8E4A}"/>
+      <thm15:themeFamily xmlns="" xmlns:thm15="http://schemas.microsoft.com/office/thememl/2012/main" name="Office Theme" id="{62F939B6-93AF-4DB8-9C6B-D6C7DFDC589F}" vid="{4A3C46E8-61CC-4603-A589-7422A47A8E4A}"/>
     </a:ext>
   </a:extLst>
 </a:theme>
@@ -22777,7 +22760,7 @@
   <a:extraClrSchemeLst/>
   <a:extLst>
     <a:ext uri="{05A4C25C-085E-4340-85A3-A5531E510DB2}">
-      <thm15:themeFamily xmlns:thm15="http://schemas.microsoft.com/office/thememl/2012/main" xmlns="" name="Office Theme" id="{62F939B6-93AF-4DB8-9C6B-D6C7DFDC589F}" vid="{4A3C46E8-61CC-4603-A589-7422A47A8E4A}"/>
+      <thm15:themeFamily xmlns="" xmlns:thm15="http://schemas.microsoft.com/office/thememl/2012/main" name="Office Theme" id="{62F939B6-93AF-4DB8-9C6B-D6C7DFDC589F}" vid="{4A3C46E8-61CC-4603-A589-7422A47A8E4A}"/>
     </a:ext>
   </a:extLst>
 </a:theme>

</xml_diff>

<commit_message>
second presentation feedback + text
</commit_message>
<xml_diff>
--- a/thesis/presentations/2 second/second.pptx
+++ b/thesis/presentations/2 second/second.pptx
@@ -144,7 +144,7 @@
   </p:defaultTextStyle>
   <p:extLst>
     <p:ext uri="{EFAFB233-063F-42B5-8137-9DF3F51BA10A}">
-      <p15:sldGuideLst xmlns:p15="http://schemas.microsoft.com/office/powerpoint/2012/main" xmlns="">
+      <p15:sldGuideLst xmlns="" xmlns:p15="http://schemas.microsoft.com/office/powerpoint/2012/main">
         <p15:guide id="1" orient="horz" pos="2160" userDrawn="1">
           <p15:clr>
             <a:srgbClr val="A4A3A4"/>
@@ -229,10 +229,6 @@
             <a:r>
               <a:rPr lang="en-US" baseline="0" dirty="0" smtClean="0"/>
               <a:t> </a:t>
-            </a:r>
-            <a:r>
-              <a:rPr lang="en-US" baseline="0" dirty="0" smtClean="0"/>
-              <a:t/>
             </a:r>
             <a:br>
               <a:rPr lang="en-US" baseline="0" dirty="0" smtClean="0"/>
@@ -442,11 +438,11 @@
           <c:showBubbleSize val="0"/>
         </c:dLbls>
         <c:gapWidth val="150"/>
-        <c:axId val="133994368"/>
-        <c:axId val="134004736"/>
+        <c:axId val="10901760"/>
+        <c:axId val="10903936"/>
       </c:barChart>
       <c:catAx>
-        <c:axId val="133994368"/>
+        <c:axId val="10901760"/>
         <c:scaling>
           <c:orientation val="minMax"/>
         </c:scaling>
@@ -476,7 +472,7 @@
         <c:majorTickMark val="out"/>
         <c:minorTickMark val="none"/>
         <c:tickLblPos val="nextTo"/>
-        <c:crossAx val="134004736"/>
+        <c:crossAx val="10903936"/>
         <c:crosses val="autoZero"/>
         <c:auto val="1"/>
         <c:lblAlgn val="ctr"/>
@@ -484,7 +480,7 @@
         <c:noMultiLvlLbl val="0"/>
       </c:catAx>
       <c:valAx>
-        <c:axId val="134004736"/>
+        <c:axId val="10903936"/>
         <c:scaling>
           <c:orientation val="minMax"/>
         </c:scaling>
@@ -515,7 +511,7 @@
         <c:majorTickMark val="out"/>
         <c:minorTickMark val="none"/>
         <c:tickLblPos val="nextTo"/>
-        <c:crossAx val="133994368"/>
+        <c:crossAx val="10901760"/>
         <c:crosses val="autoZero"/>
         <c:crossBetween val="between"/>
       </c:valAx>
@@ -1123,11 +1119,7 @@
             </a:pPr>
             <a:r>
               <a:rPr lang="nl-NL" dirty="0" smtClean="0"/>
-              <a:t>Hallo, Ik ben Sus Verwimp, een master </a:t>
-            </a:r>
-            <a:r>
-              <a:rPr lang="nl-NL" dirty="0" smtClean="0"/>
-              <a:t>student</a:t>
+              <a:t>Hallo, Ik ben Sus Verwimp, een master student</a:t>
             </a:r>
             <a:r>
               <a:rPr lang="nl-NL" baseline="0" dirty="0" smtClean="0"/>
@@ -1135,11 +1127,7 @@
             </a:r>
             <a:r>
               <a:rPr lang="nl-NL" dirty="0" smtClean="0"/>
-              <a:t>toegepaste </a:t>
-            </a:r>
-            <a:r>
-              <a:rPr lang="nl-NL" dirty="0" smtClean="0"/>
-              <a:t>informatica en mijn thesis onderwerp bestaat uit een case study over het programmeren met onzekerheid.</a:t>
+              <a:t>toegepaste informatica en mijn thesis onderwerp bestaat uit een case study over het programmeren met onzekerheid.</a:t>
             </a:r>
             <a:endParaRPr lang="en-US" baseline="0" dirty="0" smtClean="0"/>
           </a:p>
@@ -1395,11 +1383,7 @@
             </a:r>
             <a:r>
               <a:rPr lang="en-US" baseline="0" dirty="0" smtClean="0"/>
-              <a:t> </a:t>
-            </a:r>
-            <a:r>
-              <a:rPr lang="en-US" baseline="0" dirty="0" smtClean="0"/>
-              <a:t>technology, </a:t>
+              <a:t> technology, </a:t>
             </a:r>
             <a:r>
               <a:rPr lang="en-US" baseline="0" dirty="0" err="1" smtClean="0"/>
@@ -1407,11 +1391,7 @@
             </a:r>
             <a:r>
               <a:rPr lang="en-US" baseline="0" dirty="0" smtClean="0"/>
-              <a:t> </a:t>
-            </a:r>
-            <a:r>
-              <a:rPr lang="en-US" baseline="0" dirty="0" smtClean="0"/>
-              <a:t>Anglican en Church die </a:t>
+              <a:t> Anglican en Church die </a:t>
             </a:r>
             <a:r>
               <a:rPr lang="en-US" baseline="0" dirty="0" err="1" smtClean="0"/>
@@ -1615,15 +1595,7 @@
             </a:r>
             <a:r>
               <a:rPr lang="en-US" baseline="0" dirty="0" smtClean="0"/>
-              <a:t>. </a:t>
-            </a:r>
-            <a:r>
-              <a:rPr lang="en-US" baseline="0" dirty="0" smtClean="0"/>
-              <a:t>Logic </a:t>
-            </a:r>
-            <a:r>
-              <a:rPr lang="en-US" baseline="0" dirty="0" smtClean="0"/>
-              <a:t>PPL </a:t>
+              <a:t>. Logic PPL </a:t>
             </a:r>
             <a:r>
               <a:rPr lang="en-US" baseline="0" dirty="0" err="1" smtClean="0"/>
@@ -1631,15 +1603,7 @@
             </a:r>
             <a:r>
               <a:rPr lang="en-US" baseline="0" dirty="0" smtClean="0"/>
-              <a:t> </a:t>
-            </a:r>
-            <a:r>
-              <a:rPr lang="en-US" baseline="0" dirty="0" smtClean="0"/>
-              <a:t>logic </a:t>
-            </a:r>
-            <a:r>
-              <a:rPr lang="en-US" baseline="0" dirty="0" smtClean="0"/>
-              <a:t>PPL of van LISP-like PPL </a:t>
+              <a:t> logic PPL of van LISP-like PPL </a:t>
             </a:r>
             <a:r>
               <a:rPr lang="en-US" baseline="0" dirty="0" err="1" smtClean="0"/>
@@ -1751,11 +1715,7 @@
           <a:p>
             <a:r>
               <a:rPr lang="en-US" dirty="0" smtClean="0"/>
-              <a:t>Van </a:t>
-            </a:r>
-            <a:r>
-              <a:rPr lang="en-US" dirty="0" smtClean="0"/>
-              <a:t>host-</a:t>
+              <a:t>Van host-</a:t>
             </a:r>
             <a:r>
               <a:rPr lang="en-US" dirty="0" err="1" smtClean="0"/>
@@ -1763,11 +1723,7 @@
             </a:r>
             <a:r>
               <a:rPr lang="en-US" dirty="0" smtClean="0"/>
-              <a:t> </a:t>
-            </a:r>
-            <a:r>
-              <a:rPr lang="en-US" dirty="0" smtClean="0"/>
-              <a:t>PPL </a:t>
+              <a:t> PPL </a:t>
             </a:r>
             <a:r>
               <a:rPr lang="en-US" dirty="0" err="1" smtClean="0"/>
@@ -1775,11 +1731,7 @@
             </a:r>
             <a:r>
               <a:rPr lang="en-US" dirty="0" smtClean="0"/>
-              <a:t> </a:t>
-            </a:r>
-            <a:r>
-              <a:rPr lang="en-US" dirty="0" smtClean="0"/>
-              <a:t>host-</a:t>
+              <a:t> host-</a:t>
             </a:r>
             <a:r>
               <a:rPr lang="en-US" dirty="0" err="1" smtClean="0"/>
@@ -1787,11 +1739,7 @@
             </a:r>
             <a:r>
               <a:rPr lang="en-US" baseline="0" dirty="0" smtClean="0"/>
-              <a:t> </a:t>
-            </a:r>
-            <a:r>
-              <a:rPr lang="en-US" baseline="0" dirty="0" smtClean="0"/>
-              <a:t>PPL of van </a:t>
+              <a:t> PPL of van </a:t>
             </a:r>
             <a:r>
               <a:rPr lang="en-US" baseline="0" dirty="0" err="1" smtClean="0"/>
@@ -2059,15 +2007,19 @@
             </a:r>
             <a:r>
               <a:rPr lang="en-US" baseline="0" dirty="0" smtClean="0"/>
+              <a:t> is, </a:t>
+            </a:r>
+            <a:r>
+              <a:rPr lang="en-US" baseline="0" dirty="0" err="1" smtClean="0"/>
+              <a:t>maak</a:t>
+            </a:r>
+            <a:r>
+              <a:rPr lang="en-US" baseline="0" dirty="0" smtClean="0"/>
               <a:t> </a:t>
             </a:r>
             <a:r>
-              <a:rPr lang="en-US" baseline="0" dirty="0" smtClean="0"/>
-              <a:t>is, </a:t>
-            </a:r>
-            <a:r>
-              <a:rPr lang="en-US" baseline="0" dirty="0" err="1" smtClean="0"/>
-              <a:t>maak</a:t>
+              <a:rPr lang="en-US" baseline="0" dirty="0" err="1" smtClean="0"/>
+              <a:t>ik</a:t>
             </a:r>
             <a:r>
               <a:rPr lang="en-US" baseline="0" dirty="0" smtClean="0"/>
@@ -2075,82 +2027,62 @@
             </a:r>
             <a:r>
               <a:rPr lang="en-US" baseline="0" dirty="0" err="1" smtClean="0"/>
+              <a:t>gebruik</a:t>
+            </a:r>
+            <a:r>
+              <a:rPr lang="en-US" baseline="0" dirty="0" smtClean="0"/>
+              <a:t> van </a:t>
+            </a:r>
+            <a:r>
+              <a:rPr lang="en-US" baseline="0" dirty="0" err="1" smtClean="0"/>
+              <a:t>een</a:t>
+            </a:r>
+            <a:r>
+              <a:rPr lang="en-US" baseline="0" dirty="0" smtClean="0"/>
+              <a:t> case study. </a:t>
+            </a:r>
+            <a:r>
+              <a:rPr lang="en-US" baseline="0" dirty="0" err="1" smtClean="0"/>
+              <a:t>Aan</a:t>
+            </a:r>
+            <a:r>
+              <a:rPr lang="en-US" baseline="0" dirty="0" smtClean="0"/>
+              <a:t> de hand van </a:t>
+            </a:r>
+            <a:r>
+              <a:rPr lang="en-US" baseline="0" dirty="0" err="1" smtClean="0"/>
+              <a:t>deze</a:t>
+            </a:r>
+            <a:r>
+              <a:rPr lang="en-US" baseline="0" dirty="0" smtClean="0"/>
+              <a:t> case study </a:t>
+            </a:r>
+            <a:r>
+              <a:rPr lang="en-US" baseline="0" dirty="0" err="1" smtClean="0"/>
+              <a:t>kan</a:t>
+            </a:r>
+            <a:r>
+              <a:rPr lang="en-US" baseline="0" dirty="0" smtClean="0"/>
+              <a:t> </a:t>
+            </a:r>
+            <a:r>
+              <a:rPr lang="en-US" baseline="0" dirty="0" err="1" smtClean="0"/>
               <a:t>ik</a:t>
             </a:r>
             <a:r>
               <a:rPr lang="en-US" baseline="0" dirty="0" smtClean="0"/>
+              <a:t> de criteria </a:t>
+            </a:r>
+            <a:r>
+              <a:rPr lang="en-US" baseline="0" dirty="0" err="1" smtClean="0"/>
+              <a:t>gaan</a:t>
+            </a:r>
+            <a:r>
+              <a:rPr lang="en-US" baseline="0" dirty="0" smtClean="0"/>
               <a:t> </a:t>
             </a:r>
             <a:r>
               <a:rPr lang="en-US" baseline="0" dirty="0" err="1" smtClean="0"/>
-              <a:t>gebruik</a:t>
-            </a:r>
-            <a:r>
-              <a:rPr lang="en-US" baseline="0" dirty="0" smtClean="0"/>
-              <a:t> van </a:t>
-            </a:r>
-            <a:r>
-              <a:rPr lang="en-US" baseline="0" dirty="0" err="1" smtClean="0"/>
-              <a:t>een</a:t>
-            </a:r>
-            <a:r>
-              <a:rPr lang="en-US" baseline="0" dirty="0" smtClean="0"/>
-              <a:t> case study. </a:t>
-            </a:r>
-            <a:r>
-              <a:rPr lang="en-US" baseline="0" dirty="0" err="1" smtClean="0"/>
-              <a:t>Aan</a:t>
-            </a:r>
-            <a:r>
-              <a:rPr lang="en-US" baseline="0" dirty="0" smtClean="0"/>
-              <a:t> de hand van </a:t>
-            </a:r>
-            <a:r>
-              <a:rPr lang="en-US" baseline="0" dirty="0" err="1" smtClean="0"/>
-              <a:t>deze</a:t>
-            </a:r>
-            <a:r>
-              <a:rPr lang="en-US" baseline="0" dirty="0" smtClean="0"/>
-              <a:t> </a:t>
-            </a:r>
-            <a:r>
-              <a:rPr lang="en-US" baseline="0" dirty="0" smtClean="0"/>
-              <a:t>case study </a:t>
-            </a:r>
-            <a:r>
-              <a:rPr lang="en-US" baseline="0" dirty="0" err="1" smtClean="0"/>
-              <a:t>kan</a:t>
-            </a:r>
-            <a:r>
-              <a:rPr lang="en-US" baseline="0" dirty="0" smtClean="0"/>
-              <a:t> </a:t>
-            </a:r>
-            <a:r>
-              <a:rPr lang="en-US" baseline="0" dirty="0" err="1" smtClean="0"/>
-              <a:t>ik</a:t>
-            </a:r>
-            <a:r>
-              <a:rPr lang="en-US" baseline="0" dirty="0" smtClean="0"/>
-              <a:t> </a:t>
-            </a:r>
-            <a:r>
-              <a:rPr lang="en-US" baseline="0" dirty="0" smtClean="0"/>
-              <a:t>de </a:t>
-            </a:r>
-            <a:r>
-              <a:rPr lang="en-US" baseline="0" dirty="0" smtClean="0"/>
-              <a:t>criteria </a:t>
-            </a:r>
-            <a:r>
-              <a:rPr lang="en-US" baseline="0" dirty="0" err="1" smtClean="0"/>
-              <a:t>gaan</a:t>
-            </a:r>
-            <a:r>
-              <a:rPr lang="en-US" baseline="0" dirty="0" smtClean="0"/>
-              <a:t> </a:t>
-            </a:r>
-            <a:r>
-              <a:rPr lang="en-US" baseline="0" dirty="0" err="1" smtClean="0"/>
               <a:t>evaluaren</a:t>
             </a:r>
             <a:r>
@@ -2163,11 +2095,7 @@
             </a:r>
             <a:r>
               <a:rPr lang="en-US" baseline="0" dirty="0" smtClean="0"/>
-              <a:t> </a:t>
-            </a:r>
-            <a:r>
-              <a:rPr lang="en-US" baseline="0" dirty="0" smtClean="0"/>
-              <a:t>slides </a:t>
+              <a:t> slides </a:t>
             </a:r>
             <a:r>
               <a:rPr lang="en-US" baseline="0" dirty="0" err="1" smtClean="0"/>
@@ -2536,11 +2464,7 @@
             </a:r>
             <a:r>
               <a:rPr lang="en-US" baseline="0" dirty="0" smtClean="0"/>
-              <a:t> </a:t>
-            </a:r>
-            <a:r>
-              <a:rPr lang="en-US" baseline="0" dirty="0" smtClean="0"/>
-              <a:t>het de </a:t>
+              <a:t> het de </a:t>
             </a:r>
             <a:r>
               <a:rPr lang="en-US" baseline="0" dirty="0" err="1" smtClean="0"/>
@@ -2580,31 +2504,23 @@
             </a:r>
             <a:r>
               <a:rPr lang="en-US" baseline="0" dirty="0" smtClean="0"/>
+              <a:t> (ProbLog2 </a:t>
+            </a:r>
+            <a:r>
+              <a:rPr lang="en-US" baseline="0" dirty="0" err="1" smtClean="0"/>
+              <a:t>logisch</a:t>
+            </a:r>
+            <a:r>
+              <a:rPr lang="en-US" baseline="0" dirty="0" smtClean="0"/>
               <a:t> </a:t>
             </a:r>
             <a:r>
-              <a:rPr lang="en-US" baseline="0" dirty="0" smtClean="0"/>
-              <a:t>(ProbLog2 </a:t>
-            </a:r>
-            <a:r>
-              <a:rPr lang="en-US" baseline="0" dirty="0" err="1" smtClean="0"/>
-              <a:t>logisch</a:t>
-            </a:r>
-            <a:r>
-              <a:rPr lang="en-US" baseline="0" dirty="0" smtClean="0"/>
-              <a:t> </a:t>
-            </a:r>
-            <a:r>
               <a:rPr lang="en-US" baseline="0" dirty="0" err="1" smtClean="0"/>
               <a:t>programmeren</a:t>
             </a:r>
             <a:r>
               <a:rPr lang="en-US" baseline="0" dirty="0" smtClean="0"/>
-              <a:t>, </a:t>
-            </a:r>
-            <a:r>
-              <a:rPr lang="en-US" baseline="0" dirty="0" smtClean="0"/>
-              <a:t>Anglican </a:t>
+              <a:t>, Anglican </a:t>
             </a:r>
             <a:r>
               <a:rPr lang="en-US" baseline="0" dirty="0" err="1" smtClean="0"/>
@@ -3152,31 +3068,27 @@
             </a:r>
             <a:r>
               <a:rPr lang="nl-NL" baseline="0" dirty="0" smtClean="0"/>
-              <a:t> geef ik </a:t>
-            </a:r>
-            <a:r>
-              <a:rPr lang="nl-NL" baseline="0" dirty="0" smtClean="0"/>
-              <a:t>eerst een </a:t>
-            </a:r>
-            <a:r>
-              <a:rPr lang="nl-NL" baseline="0" dirty="0" smtClean="0"/>
-              <a:t>korte achtergrond </a:t>
-            </a:r>
-            <a:r>
-              <a:rPr lang="nl-NL" baseline="0" dirty="0" smtClean="0"/>
-              <a:t>informatie;</a:t>
+              <a:t> geef ik eerst een korte achtergrond informatie;</a:t>
             </a:r>
             <a:r>
               <a:rPr lang="nl-NL" dirty="0" smtClean="0"/>
+              <a:t> de context van mijn thesis;</a:t>
+            </a:r>
+            <a:r>
+              <a:rPr lang="en-US" baseline="0" dirty="0" smtClean="0"/>
               <a:t> </a:t>
             </a:r>
             <a:r>
-              <a:rPr lang="nl-NL" dirty="0" smtClean="0"/>
-              <a:t>de context van mijn </a:t>
-            </a:r>
-            <a:r>
-              <a:rPr lang="nl-NL" dirty="0" smtClean="0"/>
-              <a:t>thesis;</a:t>
+              <a:rPr lang="en-US" baseline="0" dirty="0" err="1" smtClean="0"/>
+              <a:t>daarna</a:t>
+            </a:r>
+            <a:r>
+              <a:rPr lang="en-US" baseline="0" dirty="0" smtClean="0"/>
+              <a:t> de </a:t>
+            </a:r>
+            <a:r>
+              <a:rPr lang="en-US" baseline="0" dirty="0" err="1" smtClean="0"/>
+              <a:t>motivatie</a:t>
             </a:r>
             <a:r>
               <a:rPr lang="en-US" baseline="0" dirty="0" smtClean="0"/>
@@ -3184,19 +3096,15 @@
             </a:r>
             <a:r>
               <a:rPr lang="en-US" baseline="0" dirty="0" err="1" smtClean="0"/>
-              <a:t>daarna</a:t>
+              <a:t>waarom</a:t>
             </a:r>
             <a:r>
               <a:rPr lang="en-US" baseline="0" dirty="0" smtClean="0"/>
               <a:t> </a:t>
             </a:r>
             <a:r>
-              <a:rPr lang="en-US" baseline="0" dirty="0" smtClean="0"/>
-              <a:t>de </a:t>
-            </a:r>
-            <a:r>
-              <a:rPr lang="en-US" baseline="0" dirty="0" err="1" smtClean="0"/>
-              <a:t>motivatie</a:t>
+              <a:rPr lang="en-US" baseline="0" dirty="0" err="1" smtClean="0"/>
+              <a:t>ik</a:t>
             </a:r>
             <a:r>
               <a:rPr lang="en-US" baseline="0" dirty="0" smtClean="0"/>
@@ -3204,7 +3112,7 @@
             </a:r>
             <a:r>
               <a:rPr lang="en-US" baseline="0" dirty="0" err="1" smtClean="0"/>
-              <a:t>waarom</a:t>
+              <a:t>dit</a:t>
             </a:r>
             <a:r>
               <a:rPr lang="en-US" baseline="0" dirty="0" smtClean="0"/>
@@ -3212,7 +3120,7 @@
             </a:r>
             <a:r>
               <a:rPr lang="en-US" baseline="0" dirty="0" err="1" smtClean="0"/>
-              <a:t>ik</a:t>
+              <a:t>ga</a:t>
             </a:r>
             <a:r>
               <a:rPr lang="en-US" baseline="0" dirty="0" smtClean="0"/>
@@ -3220,7 +3128,15 @@
             </a:r>
             <a:r>
               <a:rPr lang="en-US" baseline="0" dirty="0" err="1" smtClean="0"/>
-              <a:t>dit</a:t>
+              <a:t>doen</a:t>
+            </a:r>
+            <a:r>
+              <a:rPr lang="en-US" baseline="0" dirty="0" smtClean="0"/>
+              <a:t> en tot slot de tot nu toe </a:t>
+            </a:r>
+            <a:r>
+              <a:rPr lang="en-US" baseline="0" dirty="0" err="1" smtClean="0"/>
+              <a:t>behaalde</a:t>
             </a:r>
             <a:r>
               <a:rPr lang="en-US" baseline="0" dirty="0" smtClean="0"/>
@@ -3228,43 +3144,11 @@
             </a:r>
             <a:r>
               <a:rPr lang="en-US" baseline="0" dirty="0" err="1" smtClean="0"/>
-              <a:t>ga</a:t>
-            </a:r>
-            <a:r>
-              <a:rPr lang="en-US" baseline="0" dirty="0" smtClean="0"/>
-              <a:t> </a:t>
-            </a:r>
-            <a:r>
-              <a:rPr lang="en-US" baseline="0" dirty="0" err="1" smtClean="0"/>
-              <a:t>doen</a:t>
-            </a:r>
-            <a:r>
-              <a:rPr lang="en-US" baseline="0" dirty="0" smtClean="0"/>
-              <a:t> en tot slot de tot </a:t>
-            </a:r>
-            <a:r>
-              <a:rPr lang="en-US" baseline="0" dirty="0" smtClean="0"/>
-              <a:t>nu toe </a:t>
-            </a:r>
-            <a:r>
-              <a:rPr lang="en-US" baseline="0" dirty="0" err="1" smtClean="0"/>
-              <a:t>behaalde</a:t>
-            </a:r>
-            <a:r>
-              <a:rPr lang="en-US" baseline="0" dirty="0" smtClean="0"/>
-              <a:t> </a:t>
-            </a:r>
-            <a:r>
-              <a:rPr lang="en-US" baseline="0" dirty="0" err="1" smtClean="0"/>
               <a:t>resultaten</a:t>
             </a:r>
             <a:r>
               <a:rPr lang="en-US" baseline="0" dirty="0" smtClean="0"/>
-              <a:t> </a:t>
-            </a:r>
-            <a:r>
-              <a:rPr lang="en-US" baseline="0" dirty="0" smtClean="0"/>
-              <a:t>en </a:t>
+              <a:t> en </a:t>
             </a:r>
             <a:r>
               <a:rPr lang="en-US" baseline="0" dirty="0" err="1" smtClean="0"/>
@@ -3280,11 +3164,7 @@
             </a:r>
             <a:r>
               <a:rPr lang="en-US" baseline="0" dirty="0" smtClean="0"/>
-              <a:t> </a:t>
-            </a:r>
-            <a:r>
-              <a:rPr lang="en-US" baseline="0" dirty="0" smtClean="0"/>
-              <a:t>de </a:t>
+              <a:t> de </a:t>
             </a:r>
             <a:r>
               <a:rPr lang="en-US" baseline="0" dirty="0" err="1" smtClean="0"/>
@@ -3891,11 +3771,7 @@
             </a:r>
             <a:r>
               <a:rPr lang="en-US" baseline="0" dirty="0" smtClean="0"/>
-              <a:t> </a:t>
-            </a:r>
-            <a:r>
-              <a:rPr lang="en-US" baseline="0" dirty="0" smtClean="0"/>
-              <a:t>van de </a:t>
+              <a:t> van de </a:t>
             </a:r>
             <a:r>
               <a:rPr lang="en-US" baseline="0" dirty="0" err="1" smtClean="0"/>
@@ -3923,19 +3799,7 @@
             </a:r>
             <a:r>
               <a:rPr lang="en-US" baseline="0" dirty="0" smtClean="0"/>
-              <a:t>is de Bayes</a:t>
-            </a:r>
-            <a:r>
-              <a:rPr lang="en-US" baseline="0" dirty="0" smtClean="0"/>
-              <a:t>’ </a:t>
-            </a:r>
-            <a:r>
-              <a:rPr lang="en-US" baseline="0" dirty="0" smtClean="0"/>
-              <a:t>Rule</a:t>
-            </a:r>
-            <a:r>
-              <a:rPr lang="en-US" baseline="0" dirty="0" smtClean="0"/>
-              <a:t>.</a:t>
+              <a:t>is de Bayes’ Rule.</a:t>
             </a:r>
           </a:p>
           <a:p>
@@ -4284,11 +4148,111 @@
             </a:r>
             <a:r>
               <a:rPr lang="en-US" baseline="0" dirty="0" smtClean="0"/>
+              <a:t> de </a:t>
+            </a:r>
+            <a:r>
+              <a:rPr lang="en-US" baseline="0" dirty="0" err="1" smtClean="0"/>
+              <a:t>uitkomst</a:t>
+            </a:r>
+            <a:r>
+              <a:rPr lang="en-US" baseline="0" dirty="0" smtClean="0"/>
+              <a:t> 15 </a:t>
+            </a:r>
+            <a:r>
+              <a:rPr lang="en-US" baseline="0" dirty="0" err="1" smtClean="0"/>
+              <a:t>keer</a:t>
+            </a:r>
+            <a:r>
+              <a:rPr lang="en-US" baseline="0" dirty="0" smtClean="0"/>
+              <a:t> munt is en 5 </a:t>
+            </a:r>
+            <a:r>
+              <a:rPr lang="en-US" baseline="0" dirty="0" err="1" smtClean="0"/>
+              <a:t>keer</a:t>
+            </a:r>
+            <a:r>
+              <a:rPr lang="en-US" baseline="0" dirty="0" smtClean="0"/>
+              <a:t> kop. </a:t>
+            </a:r>
+            <a:r>
+              <a:rPr lang="en-US" baseline="0" dirty="0" err="1" smtClean="0"/>
+              <a:t>Wat</a:t>
+            </a:r>
+            <a:r>
+              <a:rPr lang="en-US" baseline="0" dirty="0" smtClean="0"/>
+              <a:t> is nu de </a:t>
+            </a:r>
+            <a:r>
+              <a:rPr lang="en-US" baseline="0" dirty="0" err="1" smtClean="0"/>
+              <a:t>kans</a:t>
+            </a:r>
+            <a:r>
+              <a:rPr lang="en-US" baseline="0" dirty="0" smtClean="0"/>
               <a:t> </a:t>
             </a:r>
             <a:r>
-              <a:rPr lang="en-US" baseline="0" dirty="0" smtClean="0"/>
-              <a:t>de </a:t>
+              <a:rPr lang="en-US" baseline="0" dirty="0" err="1" smtClean="0"/>
+              <a:t>dat</a:t>
+            </a:r>
+            <a:r>
+              <a:rPr lang="en-US" baseline="0" dirty="0" smtClean="0"/>
+              <a:t> </a:t>
+            </a:r>
+            <a:r>
+              <a:rPr lang="en-US" baseline="0" dirty="0" err="1" smtClean="0"/>
+              <a:t>dit</a:t>
+            </a:r>
+            <a:r>
+              <a:rPr lang="en-US" baseline="0" dirty="0" smtClean="0"/>
+              <a:t> </a:t>
+            </a:r>
+            <a:r>
+              <a:rPr lang="en-US" baseline="0" dirty="0" err="1" smtClean="0"/>
+              <a:t>muntstuk</a:t>
+            </a:r>
+            <a:r>
+              <a:rPr lang="en-US" baseline="0" dirty="0" smtClean="0"/>
+              <a:t> </a:t>
+            </a:r>
+            <a:r>
+              <a:rPr lang="en-US" baseline="0" dirty="0" err="1" smtClean="0"/>
+              <a:t>eerlijk</a:t>
+            </a:r>
+            <a:r>
+              <a:rPr lang="en-US" baseline="0" dirty="0" smtClean="0"/>
+              <a:t> is? </a:t>
+            </a:r>
+            <a:r>
+              <a:rPr lang="en-US" baseline="0" dirty="0" err="1" smtClean="0"/>
+              <a:t>Hier</a:t>
+            </a:r>
+            <a:r>
+              <a:rPr lang="en-US" baseline="0" dirty="0" smtClean="0"/>
+              <a:t> is het </a:t>
+            </a:r>
+            <a:r>
+              <a:rPr lang="en-US" baseline="0" dirty="0" err="1" smtClean="0"/>
+              <a:t>bewijs</a:t>
+            </a:r>
+            <a:r>
+              <a:rPr lang="en-US" baseline="0" dirty="0" smtClean="0"/>
+              <a:t>: de 20 </a:t>
+            </a:r>
+            <a:r>
+              <a:rPr lang="en-US" baseline="0" dirty="0" err="1" smtClean="0"/>
+              <a:t>tossen</a:t>
+            </a:r>
+            <a:r>
+              <a:rPr lang="en-US" baseline="0" dirty="0" smtClean="0"/>
+              <a:t> met </a:t>
+            </a:r>
+            <a:r>
+              <a:rPr lang="en-US" baseline="0" dirty="0" err="1" smtClean="0"/>
+              <a:t>hun</a:t>
+            </a:r>
+            <a:r>
+              <a:rPr lang="en-US" baseline="0" dirty="0" smtClean="0"/>
+              <a:t> </a:t>
             </a:r>
             <a:r>
               <a:rPr lang="en-US" baseline="0" dirty="0" err="1" smtClean="0"/>
@@ -4296,35 +4260,11 @@
             </a:r>
             <a:r>
               <a:rPr lang="en-US" baseline="0" dirty="0" smtClean="0"/>
-              <a:t> 15 </a:t>
-            </a:r>
-            <a:r>
-              <a:rPr lang="en-US" baseline="0" dirty="0" err="1" smtClean="0"/>
-              <a:t>keer</a:t>
-            </a:r>
-            <a:r>
-              <a:rPr lang="en-US" baseline="0" dirty="0" smtClean="0"/>
-              <a:t> munt is en 5 </a:t>
-            </a:r>
-            <a:r>
-              <a:rPr lang="en-US" baseline="0" dirty="0" err="1" smtClean="0"/>
-              <a:t>keer</a:t>
-            </a:r>
-            <a:r>
-              <a:rPr lang="en-US" baseline="0" dirty="0" smtClean="0"/>
-              <a:t> kop. </a:t>
-            </a:r>
-            <a:r>
-              <a:rPr lang="en-US" baseline="0" dirty="0" err="1" smtClean="0"/>
-              <a:t>Wat</a:t>
-            </a:r>
-            <a:r>
-              <a:rPr lang="en-US" baseline="0" dirty="0" smtClean="0"/>
-              <a:t> is nu de </a:t>
-            </a:r>
-            <a:r>
-              <a:rPr lang="en-US" baseline="0" dirty="0" err="1" smtClean="0"/>
-              <a:t>kans</a:t>
+              <a:t> en de </a:t>
+            </a:r>
+            <a:r>
+              <a:rPr lang="en-US" baseline="0" dirty="0" err="1" smtClean="0"/>
+              <a:t>hypothese</a:t>
             </a:r>
             <a:r>
               <a:rPr lang="en-US" baseline="0" dirty="0" smtClean="0"/>
@@ -4336,11 +4276,27 @@
             </a:r>
             <a:r>
               <a:rPr lang="en-US" baseline="0" dirty="0" smtClean="0"/>
+              <a:t> het </a:t>
+            </a:r>
+            <a:r>
+              <a:rPr lang="en-US" baseline="0" dirty="0" err="1" smtClean="0"/>
+              <a:t>muntstuk</a:t>
+            </a:r>
+            <a:r>
+              <a:rPr lang="en-US" baseline="0" dirty="0" smtClean="0"/>
               <a:t> </a:t>
             </a:r>
             <a:r>
               <a:rPr lang="en-US" baseline="0" dirty="0" err="1" smtClean="0"/>
-              <a:t>dit</a:t>
+              <a:t>eerlijk</a:t>
+            </a:r>
+            <a:r>
+              <a:rPr lang="en-US" baseline="0" dirty="0" smtClean="0"/>
+              <a:t> is. </a:t>
+            </a:r>
+            <a:r>
+              <a:rPr lang="en-US" baseline="0" dirty="0" err="1" smtClean="0"/>
+              <a:t>Dit</a:t>
             </a:r>
             <a:r>
               <a:rPr lang="en-US" baseline="0" dirty="0" smtClean="0"/>
@@ -4348,7 +4304,15 @@
             </a:r>
             <a:r>
               <a:rPr lang="en-US" baseline="0" dirty="0" err="1" smtClean="0"/>
-              <a:t>muntstuk</a:t>
+              <a:t>noemen</a:t>
+            </a:r>
+            <a:r>
+              <a:rPr lang="en-US" baseline="0" dirty="0" smtClean="0"/>
+              <a:t> we </a:t>
+            </a:r>
+            <a:r>
+              <a:rPr lang="en-US" baseline="0" dirty="0" err="1" smtClean="0"/>
+              <a:t>ook</a:t>
             </a:r>
             <a:r>
               <a:rPr lang="en-US" baseline="0" dirty="0" smtClean="0"/>
@@ -4356,19 +4320,35 @@
             </a:r>
             <a:r>
               <a:rPr lang="en-US" baseline="0" dirty="0" err="1" smtClean="0"/>
-              <a:t>eerlijk</a:t>
-            </a:r>
-            <a:r>
-              <a:rPr lang="en-US" baseline="0" dirty="0" smtClean="0"/>
-              <a:t> is? </a:t>
-            </a:r>
-            <a:r>
-              <a:rPr lang="en-US" baseline="0" dirty="0" err="1" smtClean="0"/>
-              <a:t>Hier</a:t>
-            </a:r>
-            <a:r>
-              <a:rPr lang="en-US" baseline="0" dirty="0" smtClean="0"/>
-              <a:t> is het </a:t>
+              <a:t>inferentie</a:t>
+            </a:r>
+            <a:r>
+              <a:rPr lang="en-US" baseline="0" dirty="0" smtClean="0"/>
+              <a:t> van </a:t>
+            </a:r>
+            <a:r>
+              <a:rPr lang="en-US" baseline="0" dirty="0" err="1" smtClean="0"/>
+              <a:t>een</a:t>
+            </a:r>
+            <a:r>
+              <a:rPr lang="en-US" baseline="0" dirty="0" smtClean="0"/>
+              <a:t> </a:t>
+            </a:r>
+            <a:r>
+              <a:rPr lang="en-US" baseline="0" dirty="0" err="1" smtClean="0"/>
+              <a:t>hypothese</a:t>
+            </a:r>
+            <a:r>
+              <a:rPr lang="en-US" baseline="0" dirty="0" smtClean="0"/>
+              <a:t> </a:t>
+            </a:r>
+            <a:r>
+              <a:rPr lang="en-US" baseline="0" dirty="0" err="1" smtClean="0"/>
+              <a:t>aan</a:t>
+            </a:r>
+            <a:r>
+              <a:rPr lang="en-US" baseline="0" dirty="0" smtClean="0"/>
+              <a:t> de hand van het </a:t>
             </a:r>
             <a:r>
               <a:rPr lang="en-US" baseline="0" dirty="0" err="1" smtClean="0"/>
@@ -4376,23 +4356,21 @@
             </a:r>
             <a:r>
               <a:rPr lang="en-US" baseline="0" dirty="0" smtClean="0"/>
-              <a:t>: de </a:t>
-            </a:r>
-            <a:r>
-              <a:rPr lang="en-US" baseline="0" dirty="0" smtClean="0"/>
-              <a:t>20 </a:t>
-            </a:r>
-            <a:r>
-              <a:rPr lang="en-US" baseline="0" dirty="0" err="1" smtClean="0"/>
-              <a:t>tossen</a:t>
-            </a:r>
-            <a:r>
-              <a:rPr lang="en-US" baseline="0" dirty="0" smtClean="0"/>
-              <a:t> met </a:t>
-            </a:r>
-            <a:r>
-              <a:rPr lang="en-US" baseline="0" dirty="0" err="1" smtClean="0"/>
-              <a:t>hun</a:t>
+              <a:t>.</a:t>
+            </a:r>
+          </a:p>
+          <a:p>
+            <a:r>
+              <a:rPr lang="en-US" baseline="0" dirty="0" err="1" smtClean="0"/>
+              <a:t>Inferentie</a:t>
+            </a:r>
+            <a:r>
+              <a:rPr lang="en-US" baseline="0" dirty="0" smtClean="0"/>
+              <a:t> van </a:t>
+            </a:r>
+            <a:r>
+              <a:rPr lang="en-US" baseline="0" dirty="0" err="1" smtClean="0"/>
+              <a:t>een</a:t>
             </a:r>
             <a:r>
               <a:rPr lang="en-US" baseline="0" dirty="0" smtClean="0"/>
@@ -4400,14 +4378,6 @@
             </a:r>
             <a:r>
               <a:rPr lang="en-US" baseline="0" dirty="0" err="1" smtClean="0"/>
-              <a:t>uitkomst</a:t>
-            </a:r>
-            <a:r>
-              <a:rPr lang="en-US" baseline="0" dirty="0" smtClean="0"/>
-              <a:t> en de </a:t>
-            </a:r>
-            <a:r>
-              <a:rPr lang="en-US" baseline="0" dirty="0" err="1" smtClean="0"/>
               <a:t>hypothese</a:t>
             </a:r>
             <a:r>
@@ -4416,141 +4386,11 @@
             </a:r>
             <a:r>
               <a:rPr lang="en-US" baseline="0" dirty="0" err="1" smtClean="0"/>
-              <a:t>dat</a:t>
-            </a:r>
-            <a:r>
-              <a:rPr lang="en-US" baseline="0" dirty="0" smtClean="0"/>
-              <a:t> </a:t>
-            </a:r>
-            <a:r>
-              <a:rPr lang="en-US" baseline="0" dirty="0" smtClean="0"/>
-              <a:t>het </a:t>
-            </a:r>
-            <a:r>
-              <a:rPr lang="en-US" baseline="0" dirty="0" err="1" smtClean="0"/>
-              <a:t>muntstuk</a:t>
-            </a:r>
-            <a:r>
-              <a:rPr lang="en-US" baseline="0" dirty="0" smtClean="0"/>
-              <a:t> </a:t>
-            </a:r>
-            <a:r>
-              <a:rPr lang="en-US" baseline="0" dirty="0" err="1" smtClean="0"/>
-              <a:t>eerlijk</a:t>
-            </a:r>
-            <a:r>
-              <a:rPr lang="en-US" baseline="0" dirty="0" smtClean="0"/>
-              <a:t> is. </a:t>
-            </a:r>
-            <a:r>
-              <a:rPr lang="en-US" baseline="0" dirty="0" err="1" smtClean="0"/>
-              <a:t>Dit</a:t>
-            </a:r>
-            <a:r>
-              <a:rPr lang="en-US" baseline="0" dirty="0" smtClean="0"/>
-              <a:t> </a:t>
-            </a:r>
-            <a:r>
-              <a:rPr lang="en-US" baseline="0" dirty="0" err="1" smtClean="0"/>
-              <a:t>noemen</a:t>
-            </a:r>
-            <a:r>
-              <a:rPr lang="en-US" baseline="0" dirty="0" smtClean="0"/>
-              <a:t> we </a:t>
-            </a:r>
-            <a:r>
-              <a:rPr lang="en-US" baseline="0" dirty="0" err="1" smtClean="0"/>
-              <a:t>ook</a:t>
-            </a:r>
-            <a:r>
-              <a:rPr lang="en-US" baseline="0" dirty="0" smtClean="0"/>
-              <a:t> </a:t>
-            </a:r>
-            <a:r>
-              <a:rPr lang="en-US" baseline="0" dirty="0" err="1" smtClean="0"/>
-              <a:t>inferentie</a:t>
-            </a:r>
-            <a:r>
-              <a:rPr lang="en-US" baseline="0" dirty="0" smtClean="0"/>
-              <a:t> van </a:t>
-            </a:r>
-            <a:r>
-              <a:rPr lang="en-US" baseline="0" dirty="0" err="1" smtClean="0"/>
-              <a:t>een</a:t>
-            </a:r>
-            <a:r>
-              <a:rPr lang="en-US" baseline="0" dirty="0" smtClean="0"/>
-              <a:t> </a:t>
-            </a:r>
-            <a:r>
-              <a:rPr lang="en-US" baseline="0" dirty="0" err="1" smtClean="0"/>
-              <a:t>hypothese</a:t>
-            </a:r>
-            <a:r>
-              <a:rPr lang="en-US" baseline="0" dirty="0" smtClean="0"/>
-              <a:t> </a:t>
-            </a:r>
-            <a:r>
-              <a:rPr lang="en-US" baseline="0" dirty="0" err="1" smtClean="0"/>
               <a:t>aan</a:t>
             </a:r>
             <a:r>
               <a:rPr lang="en-US" baseline="0" dirty="0" smtClean="0"/>
-              <a:t> de hand van </a:t>
-            </a:r>
-            <a:r>
-              <a:rPr lang="en-US" baseline="0" dirty="0" smtClean="0"/>
-              <a:t>het </a:t>
-            </a:r>
-            <a:r>
-              <a:rPr lang="en-US" baseline="0" dirty="0" err="1" smtClean="0"/>
-              <a:t>bewijs</a:t>
-            </a:r>
-            <a:r>
-              <a:rPr lang="en-US" baseline="0" dirty="0" smtClean="0"/>
-              <a:t>.</a:t>
-            </a:r>
-          </a:p>
-          <a:p>
-            <a:r>
-              <a:rPr lang="en-US" baseline="0" dirty="0" err="1" smtClean="0"/>
-              <a:t>Inferentie</a:t>
-            </a:r>
-            <a:r>
-              <a:rPr lang="en-US" baseline="0" dirty="0" smtClean="0"/>
-              <a:t> </a:t>
-            </a:r>
-            <a:r>
-              <a:rPr lang="en-US" baseline="0" dirty="0" smtClean="0"/>
-              <a:t>van </a:t>
-            </a:r>
-            <a:r>
-              <a:rPr lang="en-US" baseline="0" dirty="0" err="1" smtClean="0"/>
-              <a:t>een</a:t>
-            </a:r>
-            <a:r>
-              <a:rPr lang="en-US" baseline="0" dirty="0" smtClean="0"/>
-              <a:t> </a:t>
-            </a:r>
-            <a:r>
-              <a:rPr lang="en-US" baseline="0" dirty="0" err="1" smtClean="0"/>
-              <a:t>hypothese</a:t>
-            </a:r>
-            <a:r>
-              <a:rPr lang="en-US" baseline="0" dirty="0" smtClean="0"/>
-              <a:t> </a:t>
-            </a:r>
-            <a:r>
-              <a:rPr lang="en-US" baseline="0" dirty="0" err="1" smtClean="0"/>
-              <a:t>aan</a:t>
-            </a:r>
-            <a:r>
-              <a:rPr lang="en-US" baseline="0" dirty="0" smtClean="0"/>
-              <a:t> de hand </a:t>
-            </a:r>
-            <a:r>
-              <a:rPr lang="en-US" baseline="0" dirty="0" smtClean="0"/>
-              <a:t>van het </a:t>
+              <a:t> de hand van het </a:t>
             </a:r>
             <a:r>
               <a:rPr lang="en-US" baseline="0" dirty="0" err="1" smtClean="0"/>
@@ -4710,11 +4550,7 @@
             </a:r>
             <a:r>
               <a:rPr lang="en-US" baseline="0" dirty="0" smtClean="0"/>
-              <a:t> Programming Languages (PPL’s)? </a:t>
-            </a:r>
-            <a:r>
-              <a:rPr lang="en-US" baseline="0" dirty="0" smtClean="0"/>
-              <a:t>PPL’s </a:t>
+              <a:t> Programming Languages (PPL’s)? PPL’s </a:t>
             </a:r>
             <a:r>
               <a:rPr lang="nl-BE" baseline="0" noProof="0" dirty="0" smtClean="0"/>
@@ -4850,51 +4686,51 @@
             </a:r>
             <a:r>
               <a:rPr lang="en-US" baseline="0" dirty="0" smtClean="0"/>
+              <a:t> PPL’s. De </a:t>
+            </a:r>
+            <a:r>
+              <a:rPr lang="en-US" baseline="0" dirty="0" err="1" smtClean="0"/>
+              <a:t>lijst</a:t>
+            </a:r>
+            <a:r>
+              <a:rPr lang="en-US" baseline="0" dirty="0" smtClean="0"/>
+              <a:t> met </a:t>
+            </a:r>
+            <a:r>
+              <a:rPr lang="en-US" baseline="0" dirty="0" err="1" smtClean="0"/>
+              <a:t>verschillende</a:t>
+            </a:r>
+            <a:r>
+              <a:rPr lang="en-US" baseline="0" dirty="0" smtClean="0"/>
+              <a:t> PPL’s is </a:t>
+            </a:r>
+            <a:r>
+              <a:rPr lang="en-US" baseline="0" dirty="0" err="1" smtClean="0"/>
+              <a:t>beschikbaar</a:t>
+            </a:r>
+            <a:r>
+              <a:rPr lang="en-US" baseline="0" dirty="0" smtClean="0"/>
+              <a:t> via </a:t>
+            </a:r>
+            <a:r>
+              <a:rPr lang="en-US" baseline="0" dirty="0" err="1" smtClean="0"/>
+              <a:t>deze</a:t>
+            </a:r>
+            <a:r>
+              <a:rPr lang="en-US" baseline="0" dirty="0" smtClean="0"/>
+              <a:t> link. De 2 PPL’s </a:t>
+            </a:r>
+            <a:r>
+              <a:rPr lang="en-US" baseline="0" dirty="0" err="1" smtClean="0"/>
+              <a:t>waar</a:t>
+            </a:r>
+            <a:r>
+              <a:rPr lang="en-US" baseline="0" dirty="0" smtClean="0"/>
               <a:t> </a:t>
             </a:r>
             <a:r>
-              <a:rPr lang="en-US" baseline="0" dirty="0" smtClean="0"/>
-              <a:t>PPL’s. </a:t>
-            </a:r>
-            <a:r>
-              <a:rPr lang="en-US" baseline="0" dirty="0" smtClean="0"/>
-              <a:t>De </a:t>
-            </a:r>
-            <a:r>
-              <a:rPr lang="en-US" baseline="0" dirty="0" err="1" smtClean="0"/>
-              <a:t>lijst</a:t>
-            </a:r>
-            <a:r>
-              <a:rPr lang="en-US" baseline="0" dirty="0" smtClean="0"/>
-              <a:t> met </a:t>
-            </a:r>
-            <a:r>
-              <a:rPr lang="en-US" baseline="0" dirty="0" err="1" smtClean="0"/>
-              <a:t>verschillende</a:t>
-            </a:r>
-            <a:r>
-              <a:rPr lang="en-US" baseline="0" dirty="0" smtClean="0"/>
-              <a:t> PPL’s is </a:t>
-            </a:r>
-            <a:r>
-              <a:rPr lang="en-US" baseline="0" dirty="0" err="1" smtClean="0"/>
-              <a:t>beschikbaar</a:t>
-            </a:r>
-            <a:r>
-              <a:rPr lang="en-US" baseline="0" dirty="0" smtClean="0"/>
-              <a:t> via </a:t>
-            </a:r>
-            <a:r>
-              <a:rPr lang="en-US" baseline="0" dirty="0" err="1" smtClean="0"/>
-              <a:t>deze</a:t>
-            </a:r>
-            <a:r>
-              <a:rPr lang="en-US" baseline="0" dirty="0" smtClean="0"/>
-              <a:t> link. De 2 PPL’s </a:t>
-            </a:r>
-            <a:r>
-              <a:rPr lang="en-US" baseline="0" dirty="0" err="1" smtClean="0"/>
-              <a:t>waar</a:t>
+              <a:rPr lang="en-US" baseline="0" dirty="0" err="1" smtClean="0"/>
+              <a:t>ik</a:t>
             </a:r>
             <a:r>
               <a:rPr lang="en-US" baseline="0" dirty="0" smtClean="0"/>
@@ -4902,14 +4738,6 @@
             </a:r>
             <a:r>
               <a:rPr lang="en-US" baseline="0" dirty="0" err="1" smtClean="0"/>
-              <a:t>ik</a:t>
-            </a:r>
-            <a:r>
-              <a:rPr lang="en-US" baseline="0" dirty="0" smtClean="0"/>
-              <a:t> </a:t>
-            </a:r>
-            <a:r>
-              <a:rPr lang="en-US" baseline="0" dirty="0" err="1" smtClean="0"/>
               <a:t>mij</a:t>
             </a:r>
             <a:r>
@@ -4922,15 +4750,7 @@
             </a:r>
             <a:r>
               <a:rPr lang="en-US" baseline="0" dirty="0" smtClean="0"/>
-              <a:t> </a:t>
-            </a:r>
-            <a:r>
-              <a:rPr lang="en-US" baseline="0" dirty="0" smtClean="0"/>
-              <a:t>ProbLog2 </a:t>
-            </a:r>
-            <a:r>
-              <a:rPr lang="en-US" baseline="0" dirty="0" smtClean="0"/>
-              <a:t>en Anglican.</a:t>
+              <a:t> ProbLog2 en Anglican.</a:t>
             </a:r>
             <a:endParaRPr lang="en-US" dirty="0"/>
           </a:p>
@@ -5218,11 +5038,7 @@
             </a:r>
             <a:r>
               <a:rPr lang="en-US" baseline="0" dirty="0" smtClean="0"/>
-              <a:t> </a:t>
-            </a:r>
-            <a:r>
-              <a:rPr lang="en-US" baseline="0" dirty="0" smtClean="0"/>
-              <a:t>thesis, </a:t>
+              <a:t> thesis, </a:t>
             </a:r>
             <a:r>
               <a:rPr lang="en-US" baseline="0" dirty="0" err="1" smtClean="0"/>
@@ -5230,11 +5046,7 @@
             </a:r>
             <a:r>
               <a:rPr lang="en-US" baseline="0" dirty="0" smtClean="0"/>
-              <a:t> </a:t>
-            </a:r>
-            <a:r>
-              <a:rPr lang="en-US" baseline="0" dirty="0" smtClean="0"/>
-              <a:t>ben </a:t>
+              <a:t> ben </a:t>
             </a:r>
             <a:r>
               <a:rPr lang="en-US" baseline="0" dirty="0" err="1" smtClean="0"/>
@@ -5727,23 +5539,35 @@
             </a:r>
             <a:r>
               <a:rPr lang="en-US" baseline="0" dirty="0" smtClean="0"/>
+              <a:t> hoe </a:t>
+            </a:r>
+            <a:r>
+              <a:rPr lang="en-US" baseline="0" dirty="0" err="1" smtClean="0"/>
+              <a:t>gemakkelijk</a:t>
+            </a:r>
+            <a:r>
+              <a:rPr lang="en-US" baseline="0" dirty="0" smtClean="0"/>
+              <a:t> het is </a:t>
+            </a:r>
+            <a:r>
+              <a:rPr lang="en-US" baseline="0" dirty="0" err="1" smtClean="0"/>
+              <a:t>om</a:t>
+            </a:r>
+            <a:r>
+              <a:rPr lang="en-US" baseline="0" dirty="0" smtClean="0"/>
               <a:t> </a:t>
             </a:r>
             <a:r>
-              <a:rPr lang="en-US" baseline="0" dirty="0" smtClean="0"/>
-              <a:t>hoe </a:t>
-            </a:r>
-            <a:r>
-              <a:rPr lang="en-US" baseline="0" dirty="0" err="1" smtClean="0"/>
-              <a:t>gemakkelijk</a:t>
-            </a:r>
-            <a:r>
-              <a:rPr lang="en-US" baseline="0" dirty="0" smtClean="0"/>
-              <a:t> het is </a:t>
-            </a:r>
-            <a:r>
-              <a:rPr lang="en-US" baseline="0" dirty="0" err="1" smtClean="0"/>
-              <a:t>om</a:t>
+              <a:rPr lang="en-US" baseline="0" dirty="0" err="1" smtClean="0"/>
+              <a:t>distributies</a:t>
+            </a:r>
+            <a:r>
+              <a:rPr lang="en-US" baseline="0" dirty="0" smtClean="0"/>
+              <a:t> en regels van het model </a:t>
+            </a:r>
+            <a:r>
+              <a:rPr lang="en-US" baseline="0" dirty="0" err="1" smtClean="0"/>
+              <a:t>aan</a:t>
             </a:r>
             <a:r>
               <a:rPr lang="en-US" baseline="0" dirty="0" smtClean="0"/>
@@ -5751,15 +5575,7 @@
             </a:r>
             <a:r>
               <a:rPr lang="en-US" baseline="0" dirty="0" err="1" smtClean="0"/>
-              <a:t>distributies</a:t>
-            </a:r>
-            <a:r>
-              <a:rPr lang="en-US" baseline="0" dirty="0" smtClean="0"/>
-              <a:t> en regels van het model </a:t>
-            </a:r>
-            <a:r>
-              <a:rPr lang="en-US" baseline="0" dirty="0" err="1" smtClean="0"/>
-              <a:t>aan</a:t>
+              <a:t>te</a:t>
             </a:r>
             <a:r>
               <a:rPr lang="en-US" baseline="0" dirty="0" smtClean="0"/>
@@ -5767,14 +5583,6 @@
             </a:r>
             <a:r>
               <a:rPr lang="en-US" baseline="0" dirty="0" err="1" smtClean="0"/>
-              <a:t>te</a:t>
-            </a:r>
-            <a:r>
-              <a:rPr lang="en-US" baseline="0" dirty="0" smtClean="0"/>
-              <a:t> </a:t>
-            </a:r>
-            <a:r>
-              <a:rPr lang="en-US" baseline="0" dirty="0" err="1" smtClean="0"/>
               <a:t>passen</a:t>
             </a:r>
             <a:r>
@@ -5795,11 +5603,7 @@
             </a:r>
             <a:r>
               <a:rPr lang="en-US" baseline="0" dirty="0" smtClean="0"/>
-              <a:t> debugger, REPL, IDE,… </a:t>
-            </a:r>
-            <a:r>
-              <a:rPr lang="en-US" baseline="0" dirty="0" smtClean="0"/>
-              <a:t>; de </a:t>
+              <a:t> debugger, REPL, IDE,… ; de </a:t>
             </a:r>
             <a:r>
               <a:rPr lang="en-US" baseline="0" dirty="0" err="1" smtClean="0"/>
@@ -6010,15 +5814,7 @@
             </a:pPr>
             <a:r>
               <a:rPr lang="nl-NL" baseline="0" dirty="0" smtClean="0"/>
-              <a:t>Tijdens de ontwikkeling kan ik al verschillende criteria evalueren zoals welke tools er beschikbaar zijn, de moeilijkheidsgraad en </a:t>
-            </a:r>
-            <a:r>
-              <a:rPr lang="nl-NL" baseline="0" dirty="0" smtClean="0"/>
-              <a:t>het programmeerparadigma</a:t>
-            </a:r>
-            <a:r>
-              <a:rPr lang="nl-NL" baseline="0" dirty="0" smtClean="0"/>
-              <a:t>. Na de implementatie kan ik andere criteria gaan evalueren, zoals </a:t>
+              <a:t>Tijdens de ontwikkeling kan ik al verschillende criteria evalueren zoals welke tools er beschikbaar zijn, de moeilijkheidsgraad en het programmeerparadigma. Na de implementatie kan ik andere criteria gaan evalueren, zoals </a:t>
             </a:r>
             <a:r>
               <a:rPr lang="nl-NL" baseline="0" dirty="0" err="1" smtClean="0"/>
@@ -6430,7 +6226,7 @@
   </p:clrMapOvr>
   <p:extLst mod="1">
     <p:ext uri="{DCECCB84-F9BA-43D5-87BE-67443E8EF086}">
-      <p15:sldGuideLst xmlns:p15="http://schemas.microsoft.com/office/powerpoint/2012/main" xmlns="">
+      <p15:sldGuideLst xmlns="" xmlns:p15="http://schemas.microsoft.com/office/powerpoint/2012/main">
         <p15:guide id="1" orient="horz" pos="3929" userDrawn="1">
           <p15:clr>
             <a:srgbClr val="FBAE40"/>
@@ -6741,7 +6537,7 @@
   </p:clrMapOvr>
   <p:extLst mod="1">
     <p:ext uri="{DCECCB84-F9BA-43D5-87BE-67443E8EF086}">
-      <p15:sldGuideLst xmlns:p15="http://schemas.microsoft.com/office/powerpoint/2012/main" xmlns="">
+      <p15:sldGuideLst xmlns="" xmlns:p15="http://schemas.microsoft.com/office/powerpoint/2012/main">
         <p15:guide id="1" orient="horz" pos="3929">
           <p15:clr>
             <a:srgbClr val="FBAE40"/>
@@ -7094,7 +6890,7 @@
   </p:clrMapOvr>
   <p:extLst mod="1">
     <p:ext uri="{DCECCB84-F9BA-43D5-87BE-67443E8EF086}">
-      <p15:sldGuideLst xmlns:p15="http://schemas.microsoft.com/office/powerpoint/2012/main" xmlns="">
+      <p15:sldGuideLst xmlns="" xmlns:p15="http://schemas.microsoft.com/office/powerpoint/2012/main">
         <p15:guide id="1" orient="horz" pos="2160">
           <p15:clr>
             <a:srgbClr val="FBAE40"/>
@@ -7401,7 +7197,7 @@
   </p:clrMapOvr>
   <p:extLst mod="1">
     <p:ext uri="{DCECCB84-F9BA-43D5-87BE-67443E8EF086}">
-      <p15:sldGuideLst xmlns:p15="http://schemas.microsoft.com/office/powerpoint/2012/main" xmlns="">
+      <p15:sldGuideLst xmlns="" xmlns:p15="http://schemas.microsoft.com/office/powerpoint/2012/main">
         <p15:guide id="1" orient="horz" pos="2160">
           <p15:clr>
             <a:srgbClr val="FBAE40"/>
@@ -7961,7 +7757,7 @@
   </p:clrMapOvr>
   <p:extLst mod="1">
     <p:ext uri="{DCECCB84-F9BA-43D5-87BE-67443E8EF086}">
-      <p15:sldGuideLst xmlns:p15="http://schemas.microsoft.com/office/powerpoint/2012/main" xmlns="">
+      <p15:sldGuideLst xmlns="" xmlns:p15="http://schemas.microsoft.com/office/powerpoint/2012/main">
         <p15:guide id="1" orient="horz" pos="2160" userDrawn="1">
           <p15:clr>
             <a:srgbClr val="FBAE40"/>
@@ -8292,7 +8088,7 @@
   </p:clrMapOvr>
   <p:extLst mod="1">
     <p:ext uri="{DCECCB84-F9BA-43D5-87BE-67443E8EF086}">
-      <p15:sldGuideLst xmlns:p15="http://schemas.microsoft.com/office/powerpoint/2012/main" xmlns="">
+      <p15:sldGuideLst xmlns="" xmlns:p15="http://schemas.microsoft.com/office/powerpoint/2012/main">
         <p15:guide id="1" orient="horz" pos="2160" userDrawn="1">
           <p15:clr>
             <a:srgbClr val="FBAE40"/>
@@ -9919,7 +9715,7 @@
   </p:txStyles>
   <p:extLst mod="1">
     <p:ext uri="{27BBF7A9-308A-43DC-89C8-2F10F3537804}">
-      <p15:sldGuideLst xmlns:p15="http://schemas.microsoft.com/office/powerpoint/2012/main" xmlns="">
+      <p15:sldGuideLst xmlns="" xmlns:p15="http://schemas.microsoft.com/office/powerpoint/2012/main">
         <p15:guide id="1" orient="horz" pos="3816" userDrawn="1">
           <p15:clr>
             <a:srgbClr val="F26B43"/>
@@ -10551,7 +10347,7 @@
   </p:txStyles>
   <p:extLst mod="1">
     <p:ext uri="{27BBF7A9-308A-43DC-89C8-2F10F3537804}">
-      <p15:sldGuideLst xmlns:p15="http://schemas.microsoft.com/office/powerpoint/2012/main" xmlns="">
+      <p15:sldGuideLst xmlns="" xmlns:p15="http://schemas.microsoft.com/office/powerpoint/2012/main">
         <p15:guide id="1" orient="horz" pos="1026" userDrawn="1">
           <p15:clr>
             <a:srgbClr val="F26B43"/>
@@ -10614,8 +10410,12 @@
               <a:t> met </a:t>
             </a:r>
             <a:r>
+              <a:rPr lang="en-US" b="1" dirty="0" err="1"/>
+              <a:t>O</a:t>
+            </a:r>
+            <a:r>
               <a:rPr lang="en-US" b="1" dirty="0" err="1" smtClean="0"/>
-              <a:t>onzekerheid</a:t>
+              <a:t>nzekerheid</a:t>
             </a:r>
             <a:r>
               <a:rPr lang="en-US" b="1" dirty="0" smtClean="0"/>
@@ -10627,7 +10427,19 @@
             </a:r>
             <a:r>
               <a:rPr lang="en-US" b="1" dirty="0" smtClean="0"/>
-              <a:t> case study</a:t>
+              <a:t> </a:t>
+            </a:r>
+            <a:r>
+              <a:rPr lang="en-US" b="1" dirty="0" smtClean="0"/>
+              <a:t>Case </a:t>
+            </a:r>
+            <a:r>
+              <a:rPr lang="en-US" b="1" dirty="0"/>
+              <a:t>S</a:t>
+            </a:r>
+            <a:r>
+              <a:rPr lang="en-US" b="1" dirty="0" smtClean="0"/>
+              <a:t>tudy</a:t>
             </a:r>
             <a:endParaRPr lang="nl-NL" dirty="0"/>
           </a:p>
@@ -11683,11 +11495,7 @@
               <a:pPr algn="ctr"/>
               <a:r>
                 <a:rPr lang="en-US" dirty="0" smtClean="0"/>
-                <a:t>LISP </a:t>
-              </a:r>
-              <a:r>
-                <a:rPr lang="en-US" dirty="0" smtClean="0"/>
-                <a:t>PPL</a:t>
+                <a:t>LISP PPL</a:t>
               </a:r>
               <a:endParaRPr lang="en-US" dirty="0"/>
             </a:p>
@@ -11814,11 +11622,7 @@
               <a:pPr algn="ctr"/>
               <a:r>
                 <a:rPr lang="en-US" dirty="0" smtClean="0"/>
-                <a:t>LISP </a:t>
-              </a:r>
-              <a:r>
-                <a:rPr lang="en-US" dirty="0" smtClean="0"/>
-                <a:t>PPL</a:t>
+                <a:t>LISP PPL</a:t>
               </a:r>
               <a:endParaRPr lang="en-US" dirty="0"/>
             </a:p>
@@ -12751,11 +12555,7 @@
               <a:pPr algn="ctr"/>
               <a:r>
                 <a:rPr lang="en-US" dirty="0" smtClean="0"/>
-                <a:t>LISP </a:t>
-              </a:r>
-              <a:r>
-                <a:rPr lang="en-US" dirty="0" smtClean="0"/>
-                <a:t>PPL</a:t>
+                <a:t>LISP PPL</a:t>
               </a:r>
               <a:endParaRPr lang="en-US" dirty="0"/>
             </a:p>
@@ -12882,11 +12682,7 @@
               <a:pPr algn="ctr"/>
               <a:r>
                 <a:rPr lang="en-US" dirty="0" smtClean="0"/>
-                <a:t>LISP </a:t>
-              </a:r>
-              <a:r>
-                <a:rPr lang="en-US" dirty="0" smtClean="0"/>
-                <a:t>PPL</a:t>
+                <a:t>LISP PPL</a:t>
               </a:r>
               <a:endParaRPr lang="en-US" dirty="0"/>
             </a:p>
@@ -13418,6 +13214,13 @@
   <p:clrMapOvr>
     <a:masterClrMapping/>
   </p:clrMapOvr>
+  <p:timing>
+    <p:tnLst>
+      <p:par>
+        <p:cTn id="1" dur="indefinite" restart="never" nodeType="tmRoot"/>
+      </p:par>
+    </p:tnLst>
+  </p:timing>
 </p:sld>
 </file>
 
@@ -14118,26 +13921,17 @@
           <a:p>
             <a:r>
               <a:rPr lang="nl-BE" dirty="0" smtClean="0"/>
-              <a:t>Meer als 3 naast elkaar, verwijder blokken en laat rest vallen</a:t>
-            </a:r>
+              <a:t>Meer als 3 naast elkaar, verwijder blokken en laat rest vallen.</a:t>
+            </a:r>
+          </a:p>
+          <a:p>
+            <a:endParaRPr lang="nl-BE" dirty="0" smtClean="0"/>
+          </a:p>
+          <a:p>
             <a:r>
               <a:rPr lang="nl-BE" dirty="0" smtClean="0"/>
-              <a:t>.</a:t>
-            </a:r>
-          </a:p>
-          <a:p>
-            <a:endParaRPr lang="nl-BE" dirty="0" smtClean="0"/>
-          </a:p>
-          <a:p>
-            <a:r>
-              <a:rPr lang="nl-BE" dirty="0" smtClean="0"/>
-              <a:t>Zie volgende </a:t>
-            </a:r>
-            <a:r>
-              <a:rPr lang="nl-BE" dirty="0" smtClean="0"/>
-              <a:t>slide.</a:t>
-            </a:r>
-            <a:endParaRPr lang="nl-BE" dirty="0" smtClean="0"/>
+              <a:t>Zie volgende slide.</a:t>
+            </a:r>
           </a:p>
         </p:txBody>
       </p:sp>
@@ -15004,24 +14798,14 @@
           <a:p>
             <a:r>
               <a:rPr lang="nl-BE" dirty="0" smtClean="0"/>
-              <a:t>Einde </a:t>
-            </a:r>
+              <a:t>Einde beurt,</a:t>
+            </a:r>
+          </a:p>
+          <a:p>
             <a:r>
               <a:rPr lang="nl-BE" dirty="0" smtClean="0"/>
-              <a:t>beurt,</a:t>
-            </a:r>
-            <a:endParaRPr lang="nl-BE" dirty="0" smtClean="0"/>
-          </a:p>
-          <a:p>
-            <a:r>
-              <a:rPr lang="nl-BE" dirty="0" smtClean="0"/>
-              <a:t>Score is </a:t>
-            </a:r>
-            <a:r>
-              <a:rPr lang="nl-BE" dirty="0" smtClean="0"/>
-              <a:t>23.</a:t>
-            </a:r>
-            <a:endParaRPr lang="nl-BE" dirty="0" smtClean="0"/>
+              <a:t>Score is 23.</a:t>
+            </a:r>
           </a:p>
         </p:txBody>
       </p:sp>
@@ -15436,6 +15220,13 @@
   <p:clrMapOvr>
     <a:masterClrMapping/>
   </p:clrMapOvr>
+  <p:timing>
+    <p:tnLst>
+      <p:par>
+        <p:cTn id="1" dur="indefinite" restart="never" nodeType="tmRoot"/>
+      </p:par>
+    </p:tnLst>
+  </p:timing>
 </p:sld>
 </file>
 
@@ -15698,11 +15489,7 @@
           <a:p>
             <a:r>
               <a:rPr lang="nl-BE" dirty="0" smtClean="0"/>
-              <a:t>Er wordt uniform een blauwe blok gekozen om op te </a:t>
-            </a:r>
-            <a:r>
-              <a:rPr lang="nl-BE" dirty="0" smtClean="0"/>
-              <a:t>drukken.</a:t>
+              <a:t>Er wordt uniform een blauwe blok gekozen om op te drukken.</a:t>
             </a:r>
             <a:endParaRPr lang="nl-BE" dirty="0"/>
           </a:p>
@@ -16398,6 +16185,13 @@
   <p:clrMapOvr>
     <a:masterClrMapping/>
   </p:clrMapOvr>
+  <p:timing>
+    <p:tnLst>
+      <p:par>
+        <p:cTn id="1" dur="indefinite" restart="never" nodeType="tmRoot"/>
+      </p:par>
+    </p:tnLst>
+  </p:timing>
 </p:sld>
 </file>
 
@@ -16558,11 +16352,7 @@
           <a:p>
             <a:r>
               <a:rPr lang="nl-BE" dirty="0" smtClean="0"/>
-              <a:t>48 blokken met een mogelijke </a:t>
-            </a:r>
-            <a:r>
-              <a:rPr lang="nl-BE" dirty="0" smtClean="0"/>
-              <a:t>score.</a:t>
+              <a:t>48 blokken met een mogelijke score.</a:t>
             </a:r>
             <a:endParaRPr lang="nl-BE" dirty="0"/>
           </a:p>
@@ -16592,11 +16382,7 @@
           <a:p>
             <a:r>
               <a:rPr lang="nl-BE" dirty="0" smtClean="0"/>
-              <a:t>Er wordt uniform 1 blok gekozen uit de 48 mogelijke opties om op te </a:t>
-            </a:r>
-            <a:r>
-              <a:rPr lang="nl-BE" dirty="0" smtClean="0"/>
-              <a:t>drukken.</a:t>
+              <a:t>Er wordt uniform 1 blok gekozen uit de 48 mogelijke opties om op te drukken.</a:t>
             </a:r>
             <a:endParaRPr lang="nl-BE" dirty="0"/>
           </a:p>
@@ -18532,6 +18318,13 @@
   <p:clrMapOvr>
     <a:masterClrMapping/>
   </p:clrMapOvr>
+  <p:timing>
+    <p:tnLst>
+      <p:par>
+        <p:cTn id="1" dur="indefinite" restart="never" nodeType="tmRoot"/>
+      </p:par>
+    </p:tnLst>
+  </p:timing>
 </p:sld>
 </file>
 
@@ -18813,7 +18606,6 @@
               <a:rPr lang="nl-BE" sz="1400" dirty="0"/>
               <a:t>Kleuren veranderen distributie</a:t>
             </a:r>
-            <a:endParaRPr lang="nl-BE" sz="1400" dirty="0"/>
           </a:p>
         </p:txBody>
       </p:sp>
@@ -18866,6 +18658,13 @@
   <p:clrMapOvr>
     <a:masterClrMapping/>
   </p:clrMapOvr>
+  <p:timing>
+    <p:tnLst>
+      <p:par>
+        <p:cTn id="1" dur="indefinite" restart="never" nodeType="tmRoot"/>
+      </p:par>
+    </p:tnLst>
+  </p:timing>
 </p:sld>
 </file>
 
@@ -19069,6 +18868,13 @@
   <p:clrMapOvr>
     <a:masterClrMapping/>
   </p:clrMapOvr>
+  <p:timing>
+    <p:tnLst>
+      <p:par>
+        <p:cTn id="1" dur="indefinite" restart="never" nodeType="tmRoot"/>
+      </p:par>
+    </p:tnLst>
+  </p:timing>
 </p:sld>
 </file>
 
@@ -19272,6 +19078,13 @@
   <p:clrMapOvr>
     <a:masterClrMapping/>
   </p:clrMapOvr>
+  <p:timing>
+    <p:tnLst>
+      <p:par>
+        <p:cTn id="1" dur="indefinite" restart="never" nodeType="tmRoot"/>
+      </p:par>
+    </p:tnLst>
+  </p:timing>
 </p:sld>
 </file>
 
@@ -20159,6 +19972,13 @@
   <p:clrMapOvr>
     <a:masterClrMapping/>
   </p:clrMapOvr>
+  <p:timing>
+    <p:tnLst>
+      <p:par>
+        <p:cTn id="1" dur="indefinite" restart="never" nodeType="tmRoot"/>
+      </p:par>
+    </p:tnLst>
+  </p:timing>
 </p:sld>
 </file>
 
@@ -20255,11 +20075,7 @@
             </a:r>
             <a:r>
               <a:rPr lang="en-US" dirty="0" smtClean="0"/>
-              <a:t> van </a:t>
-            </a:r>
-            <a:r>
-              <a:rPr lang="en-US" dirty="0" smtClean="0"/>
-              <a:t>ProbLog2.</a:t>
+              <a:t> van ProbLog2.</a:t>
             </a:r>
           </a:p>
           <a:p>
@@ -20292,7 +20108,6 @@
               <a:rPr lang="en-US" dirty="0" smtClean="0"/>
               <a:t>,…</a:t>
             </a:r>
-            <a:endParaRPr lang="en-US" dirty="0" smtClean="0"/>
           </a:p>
           <a:p>
             <a:r>
@@ -20311,8 +20126,13 @@
             </a:r>
             <a:r>
               <a:rPr lang="en-US" dirty="0" smtClean="0"/>
-              <a:t> van Anglican.</a:t>
-            </a:r>
+              <a:t> van </a:t>
+            </a:r>
+            <a:r>
+              <a:rPr lang="en-US" dirty="0" smtClean="0"/>
+              <a:t>Anglican model.</a:t>
+            </a:r>
+            <a:endParaRPr lang="en-US" dirty="0" smtClean="0"/>
           </a:p>
           <a:p>
             <a:r>
@@ -20321,22 +20141,29 @@
             </a:r>
             <a:r>
               <a:rPr lang="en-US" dirty="0" smtClean="0"/>
-              <a:t> Anglican                 </a:t>
-            </a:r>
+              <a:t> Anglican                 ProbLog2.</a:t>
+            </a:r>
+          </a:p>
+          <a:p>
             <a:r>
               <a:rPr lang="en-US" dirty="0" smtClean="0"/>
-              <a:t>ProbLog2.</a:t>
-            </a:r>
-            <a:endParaRPr lang="en-US" dirty="0" smtClean="0"/>
-          </a:p>
-          <a:p>
+              <a:t>(</a:t>
+            </a:r>
             <a:r>
               <a:rPr lang="en-US" dirty="0" err="1" smtClean="0"/>
-              <a:t>Derde</a:t>
+              <a:t>optioneel</a:t>
+            </a:r>
+            <a:r>
+              <a:rPr lang="en-US" smtClean="0"/>
+              <a:t>) Derde</a:t>
             </a:r>
             <a:r>
               <a:rPr lang="en-US" dirty="0" smtClean="0"/>
-              <a:t> PPL </a:t>
+              <a:t> </a:t>
+            </a:r>
+            <a:r>
+              <a:rPr lang="en-US" dirty="0" smtClean="0"/>
+              <a:t>PPL </a:t>
             </a:r>
             <a:r>
               <a:rPr lang="en-US" dirty="0" err="1" smtClean="0"/>
@@ -21124,11 +20951,7 @@
             </a:r>
             <a:r>
               <a:rPr lang="en-US" dirty="0" smtClean="0"/>
-              <a:t> we </a:t>
-            </a:r>
-            <a:r>
-              <a:rPr lang="en-US" dirty="0" smtClean="0"/>
-              <a:t>het </a:t>
+              <a:t> we het </a:t>
             </a:r>
             <a:r>
               <a:rPr lang="en-US" dirty="0" err="1" smtClean="0"/>
@@ -21152,11 +20975,7 @@
             </a:r>
             <a:r>
               <a:rPr lang="en-US" dirty="0" smtClean="0"/>
-              <a:t> en </a:t>
-            </a:r>
-            <a:r>
-              <a:rPr lang="en-US" dirty="0" smtClean="0"/>
-              <a:t>we 15 </a:t>
+              <a:t> en we 15 </a:t>
             </a:r>
             <a:r>
               <a:rPr lang="en-US" dirty="0" err="1" smtClean="0"/>
@@ -21180,11 +20999,7 @@
             </a:r>
             <a:r>
               <a:rPr lang="en-US" dirty="0" smtClean="0"/>
-              <a:t> </a:t>
-            </a:r>
-            <a:r>
-              <a:rPr lang="en-US" dirty="0" smtClean="0"/>
-              <a:t>kop?</a:t>
+              <a:t> kop?</a:t>
             </a:r>
             <a:endParaRPr lang="en-US" dirty="0"/>
           </a:p>
@@ -21313,15 +21128,7 @@
             </a:br>
             <a:r>
               <a:rPr lang="en-US" dirty="0" smtClean="0"/>
-              <a:t>(PPL’s </a:t>
-            </a:r>
-            <a:r>
-              <a:rPr lang="en-US" dirty="0" smtClean="0"/>
-              <a:t>Engels</a:t>
-            </a:r>
-            <a:r>
-              <a:rPr lang="en-US" dirty="0" smtClean="0"/>
-              <a:t>)</a:t>
+              <a:t>(PPL’s Engels)</a:t>
             </a:r>
             <a:endParaRPr lang="en-US" dirty="0"/>
           </a:p>
@@ -21868,11 +21675,7 @@
             </a:br>
             <a:r>
               <a:rPr lang="en-US" dirty="0" smtClean="0"/>
-              <a:t>(PPL’s </a:t>
-            </a:r>
-            <a:r>
-              <a:rPr lang="en-US" dirty="0" smtClean="0"/>
-              <a:t>Engels</a:t>
+              <a:t>(PPL’s Engels</a:t>
             </a:r>
             <a:r>
               <a:rPr lang="en-US" dirty="0"/>
@@ -22375,15 +22178,7 @@
             <a:pPr algn="ctr"/>
             <a:r>
               <a:rPr lang="nl-BE" dirty="0" smtClean="0"/>
-              <a:t>Verschillen </a:t>
-            </a:r>
-            <a:r>
-              <a:rPr lang="nl-BE" dirty="0" smtClean="0"/>
-              <a:t>in inferentie </a:t>
-            </a:r>
-            <a:r>
-              <a:rPr lang="nl-BE" dirty="0" smtClean="0"/>
-              <a:t>methode.</a:t>
+              <a:t>Verschillen in inferentie methode.</a:t>
             </a:r>
             <a:endParaRPr lang="nl-BE" dirty="0"/>
           </a:p>
@@ -23653,7 +23448,7 @@
   <a:extraClrSchemeLst/>
   <a:extLst>
     <a:ext uri="{05A4C25C-085E-4340-85A3-A5531E510DB2}">
-      <thm15:themeFamily xmlns:thm15="http://schemas.microsoft.com/office/thememl/2012/main" xmlns="" name="Office Theme" id="{62F939B6-93AF-4DB8-9C6B-D6C7DFDC589F}" vid="{4A3C46E8-61CC-4603-A589-7422A47A8E4A}"/>
+      <thm15:themeFamily xmlns="" xmlns:thm15="http://schemas.microsoft.com/office/thememl/2012/main" name="Office Theme" id="{62F939B6-93AF-4DB8-9C6B-D6C7DFDC589F}" vid="{4A3C46E8-61CC-4603-A589-7422A47A8E4A}"/>
     </a:ext>
   </a:extLst>
 </a:theme>
@@ -23914,7 +23709,7 @@
   <a:extraClrSchemeLst/>
   <a:extLst>
     <a:ext uri="{05A4C25C-085E-4340-85A3-A5531E510DB2}">
-      <thm15:themeFamily xmlns:thm15="http://schemas.microsoft.com/office/thememl/2012/main" xmlns="" name="Office Theme" id="{62F939B6-93AF-4DB8-9C6B-D6C7DFDC589F}" vid="{4A3C46E8-61CC-4603-A589-7422A47A8E4A}"/>
+      <thm15:themeFamily xmlns="" xmlns:thm15="http://schemas.microsoft.com/office/thememl/2012/main" name="Office Theme" id="{62F939B6-93AF-4DB8-9C6B-D6C7DFDC589F}" vid="{4A3C46E8-61CC-4603-A589-7422A47A8E4A}"/>
     </a:ext>
   </a:extLst>
 </a:theme>
@@ -24175,7 +23970,7 @@
   <a:extraClrSchemeLst/>
   <a:extLst>
     <a:ext uri="{05A4C25C-085E-4340-85A3-A5531E510DB2}">
-      <thm15:themeFamily xmlns:thm15="http://schemas.microsoft.com/office/thememl/2012/main" xmlns="" name="Office Theme" id="{62F939B6-93AF-4DB8-9C6B-D6C7DFDC589F}" vid="{4A3C46E8-61CC-4603-A589-7422A47A8E4A}"/>
+      <thm15:themeFamily xmlns="" xmlns:thm15="http://schemas.microsoft.com/office/thememl/2012/main" name="Office Theme" id="{62F939B6-93AF-4DB8-9C6B-D6C7DFDC589F}" vid="{4A3C46E8-61CC-4603-A589-7422A47A8E4A}"/>
     </a:ext>
   </a:extLst>
 </a:theme>

</xml_diff>